<commit_message>
Final updation of the Code
</commit_message>
<xml_diff>
--- a/Project ppt.pptx
+++ b/Project ppt.pptx
@@ -6146,11 +6146,13 @@
           </a:xfrm>
         </p:spPr>
         <p:txBody>
-          <a:bodyPr/>
-          <a:lstStyle/>
-          <a:p>
-            <a:r>
-              <a:rPr lang="en-US" dirty="0"/>
+          <a:bodyPr>
+            <a:normAutofit/>
+          </a:bodyPr>
+          <a:lstStyle/>
+          <a:p>
+            <a:r>
+              <a:rPr lang="en-US" sz="4400" dirty="0"/>
               <a:t>6. Result</a:t>
             </a:r>
           </a:p>
@@ -6335,13 +6337,13 @@
   <p:clrMapOvr>
     <a:masterClrMapping/>
   </p:clrMapOvr>
-  <mc:AlternateContent xmlns:mc="http://schemas.openxmlformats.org/markup-compatibility/2006">
-    <mc:Choice xmlns:p159="http://schemas.microsoft.com/office/powerpoint/2015/09/main" Requires="p159">
+  <mc:AlternateContent xmlns:mc="http://schemas.openxmlformats.org/markup-compatibility/2006" xmlns:p159="http://schemas.microsoft.com/office/powerpoint/2015/09/main">
+    <mc:Choice Requires="p159">
       <p:transition xmlns:p14="http://schemas.microsoft.com/office/powerpoint/2010/main" spd="slow" p14:dur="2000">
         <p159:morph option="byObject"/>
       </p:transition>
     </mc:Choice>
-    <mc:Fallback>
+    <mc:Fallback xmlns="">
       <p:transition spd="slow">
         <p:fade/>
       </p:transition>
@@ -6390,7 +6392,7 @@
         <p:spPr>
           <a:xfrm>
             <a:off x="718345" y="1365848"/>
-            <a:ext cx="10781993" cy="5430606"/>
+            <a:ext cx="10781993" cy="5307514"/>
           </a:xfrm>
           <a:prstGeom prst="rect">
             <a:avLst/>
@@ -6442,13 +6444,13 @@
   <p:clrMapOvr>
     <a:masterClrMapping/>
   </p:clrMapOvr>
-  <mc:AlternateContent xmlns:mc="http://schemas.openxmlformats.org/markup-compatibility/2006">
-    <mc:Choice xmlns:p159="http://schemas.microsoft.com/office/powerpoint/2015/09/main" Requires="p159">
+  <mc:AlternateContent xmlns:mc="http://schemas.openxmlformats.org/markup-compatibility/2006" xmlns:p159="http://schemas.microsoft.com/office/powerpoint/2015/09/main">
+    <mc:Choice Requires="p159">
       <p:transition xmlns:p14="http://schemas.microsoft.com/office/powerpoint/2010/main" spd="slow" p14:dur="2000">
         <p159:morph option="byObject"/>
       </p:transition>
     </mc:Choice>
-    <mc:Fallback>
+    <mc:Fallback xmlns="">
       <p:transition spd="slow">
         <p:fade/>
       </p:transition>
@@ -8184,7 +8186,7 @@
         <p:spPr>
           <a:xfrm>
             <a:off x="878639" y="1921078"/>
-            <a:ext cx="3193022" cy="1754107"/>
+            <a:ext cx="3193022" cy="4084068"/>
           </a:xfrm>
         </p:spPr>
       </p:pic>
@@ -8380,8 +8382,8 @@
         </p:blipFill>
         <p:spPr>
           <a:xfrm>
-            <a:off x="554477" y="1776193"/>
-            <a:ext cx="6381344" cy="4585696"/>
+            <a:off x="554476" y="1776192"/>
+            <a:ext cx="6504435" cy="4844415"/>
           </a:xfrm>
         </p:spPr>
       </p:pic>

</xml_diff>

<commit_message>
Final commit.Updating main, ppt & report
</commit_message>
<xml_diff>
--- a/Project ppt.pptx
+++ b/Project ppt.pptx
@@ -13,15 +13,17 @@
     <p:sldId id="260" r:id="rId7"/>
     <p:sldId id="266" r:id="rId8"/>
     <p:sldId id="267" r:id="rId9"/>
-    <p:sldId id="268" r:id="rId10"/>
-    <p:sldId id="271" r:id="rId11"/>
-    <p:sldId id="269" r:id="rId12"/>
-    <p:sldId id="272" r:id="rId13"/>
+    <p:sldId id="274" r:id="rId10"/>
+    <p:sldId id="268" r:id="rId11"/>
+    <p:sldId id="271" r:id="rId12"/>
+    <p:sldId id="269" r:id="rId13"/>
     <p:sldId id="273" r:id="rId14"/>
-    <p:sldId id="270" r:id="rId15"/>
-    <p:sldId id="262" r:id="rId16"/>
-    <p:sldId id="263" r:id="rId17"/>
-    <p:sldId id="264" r:id="rId18"/>
+    <p:sldId id="272" r:id="rId15"/>
+    <p:sldId id="275" r:id="rId16"/>
+    <p:sldId id="270" r:id="rId17"/>
+    <p:sldId id="262" r:id="rId18"/>
+    <p:sldId id="263" r:id="rId19"/>
+    <p:sldId id="264" r:id="rId20"/>
   </p:sldIdLst>
   <p:sldSz cx="12192000" cy="6858000"/>
   <p:notesSz cx="6858000" cy="9144000"/>
@@ -302,7 +304,7 @@
           <a:p>
             <a:fld id="{48A87A34-81AB-432B-8DAE-1953F412C126}" type="datetimeFigureOut">
               <a:rPr lang="en-US" dirty="0"/>
-              <a:t>4/17/2018</a:t>
+              <a:t>5/5/2018</a:t>
             </a:fld>
             <a:endParaRPr lang="en-US" dirty="0"/>
           </a:p>
@@ -564,7 +566,7 @@
           <a:p>
             <a:fld id="{48A87A34-81AB-432B-8DAE-1953F412C126}" type="datetimeFigureOut">
               <a:rPr lang="en-US" dirty="0"/>
-              <a:t>4/17/2018</a:t>
+              <a:t>5/5/2018</a:t>
             </a:fld>
             <a:endParaRPr lang="en-US" dirty="0"/>
           </a:p>
@@ -791,7 +793,7 @@
             <a:fld id="{48A87A34-81AB-432B-8DAE-1953F412C126}" type="datetimeFigureOut">
               <a:rPr lang="en-US" dirty="0"/>
               <a:pPr/>
-              <a:t>4/17/2018</a:t>
+              <a:t>5/5/2018</a:t>
             </a:fld>
             <a:endParaRPr lang="en-US" dirty="0"/>
           </a:p>
@@ -1097,7 +1099,7 @@
             <a:fld id="{48A87A34-81AB-432B-8DAE-1953F412C126}" type="datetimeFigureOut">
               <a:rPr lang="en-US" dirty="0"/>
               <a:pPr/>
-              <a:t>4/17/2018</a:t>
+              <a:t>5/5/2018</a:t>
             </a:fld>
             <a:endParaRPr lang="en-US" dirty="0"/>
           </a:p>
@@ -1566,7 +1568,7 @@
             <a:fld id="{48A87A34-81AB-432B-8DAE-1953F412C126}" type="datetimeFigureOut">
               <a:rPr lang="en-US" dirty="0"/>
               <a:pPr/>
-              <a:t>4/17/2018</a:t>
+              <a:t>5/5/2018</a:t>
             </a:fld>
             <a:endParaRPr lang="en-US" dirty="0"/>
           </a:p>
@@ -2108,7 +2110,7 @@
           <a:p>
             <a:fld id="{48A87A34-81AB-432B-8DAE-1953F412C126}" type="datetimeFigureOut">
               <a:rPr lang="en-US" dirty="0"/>
-              <a:t>4/17/2018</a:t>
+              <a:t>5/5/2018</a:t>
             </a:fld>
             <a:endParaRPr lang="en-US" dirty="0"/>
           </a:p>
@@ -2877,7 +2879,7 @@
           <a:p>
             <a:fld id="{48A87A34-81AB-432B-8DAE-1953F412C126}" type="datetimeFigureOut">
               <a:rPr lang="en-US" dirty="0"/>
-              <a:t>4/17/2018</a:t>
+              <a:t>5/5/2018</a:t>
             </a:fld>
             <a:endParaRPr lang="en-US" dirty="0"/>
           </a:p>
@@ -3047,7 +3049,7 @@
           <a:p>
             <a:fld id="{48A87A34-81AB-432B-8DAE-1953F412C126}" type="datetimeFigureOut">
               <a:rPr lang="en-US" dirty="0"/>
-              <a:t>4/17/2018</a:t>
+              <a:t>5/5/2018</a:t>
             </a:fld>
             <a:endParaRPr lang="en-US" dirty="0"/>
           </a:p>
@@ -3266,7 +3268,7 @@
             <a:fld id="{48A87A34-81AB-432B-8DAE-1953F412C126}" type="datetimeFigureOut">
               <a:rPr lang="en-US" dirty="0"/>
               <a:pPr/>
-              <a:t>4/17/2018</a:t>
+              <a:t>5/5/2018</a:t>
             </a:fld>
             <a:endParaRPr lang="en-US" dirty="0"/>
           </a:p>
@@ -3441,7 +3443,7 @@
           <a:p>
             <a:fld id="{48A87A34-81AB-432B-8DAE-1953F412C126}" type="datetimeFigureOut">
               <a:rPr lang="en-US" dirty="0"/>
-              <a:t>4/17/2018</a:t>
+              <a:t>5/5/2018</a:t>
             </a:fld>
             <a:endParaRPr lang="en-US" dirty="0"/>
           </a:p>
@@ -3726,7 +3728,7 @@
             <a:fld id="{48A87A34-81AB-432B-8DAE-1953F412C126}" type="datetimeFigureOut">
               <a:rPr lang="en-US" dirty="0"/>
               <a:pPr/>
-              <a:t>4/17/2018</a:t>
+              <a:t>5/5/2018</a:t>
             </a:fld>
             <a:endParaRPr lang="en-US" dirty="0"/>
           </a:p>
@@ -3963,7 +3965,7 @@
           <a:p>
             <a:fld id="{48A87A34-81AB-432B-8DAE-1953F412C126}" type="datetimeFigureOut">
               <a:rPr lang="en-US" dirty="0"/>
-              <a:t>4/17/2018</a:t>
+              <a:t>5/5/2018</a:t>
             </a:fld>
             <a:endParaRPr lang="en-US" dirty="0"/>
           </a:p>
@@ -4337,7 +4339,7 @@
           <a:p>
             <a:fld id="{48A87A34-81AB-432B-8DAE-1953F412C126}" type="datetimeFigureOut">
               <a:rPr lang="en-US" dirty="0"/>
-              <a:t>4/17/2018</a:t>
+              <a:t>5/5/2018</a:t>
             </a:fld>
             <a:endParaRPr lang="en-US" dirty="0"/>
           </a:p>
@@ -4450,7 +4452,7 @@
           <a:p>
             <a:fld id="{48A87A34-81AB-432B-8DAE-1953F412C126}" type="datetimeFigureOut">
               <a:rPr lang="en-US" dirty="0"/>
-              <a:t>4/17/2018</a:t>
+              <a:t>5/5/2018</a:t>
             </a:fld>
             <a:endParaRPr lang="en-US" dirty="0"/>
           </a:p>
@@ -4540,7 +4542,7 @@
           <a:p>
             <a:fld id="{48A87A34-81AB-432B-8DAE-1953F412C126}" type="datetimeFigureOut">
               <a:rPr lang="en-US" dirty="0"/>
-              <a:t>4/17/2018</a:t>
+              <a:t>5/5/2018</a:t>
             </a:fld>
             <a:endParaRPr lang="en-US" dirty="0"/>
           </a:p>
@@ -4784,7 +4786,7 @@
           <a:p>
             <a:fld id="{48A87A34-81AB-432B-8DAE-1953F412C126}" type="datetimeFigureOut">
               <a:rPr lang="en-US" dirty="0"/>
-              <a:t>4/17/2018</a:t>
+              <a:t>5/5/2018</a:t>
             </a:fld>
             <a:endParaRPr lang="en-US" dirty="0"/>
           </a:p>
@@ -5036,7 +5038,7 @@
           <a:p>
             <a:fld id="{48A87A34-81AB-432B-8DAE-1953F412C126}" type="datetimeFigureOut">
               <a:rPr lang="en-US" dirty="0"/>
-              <a:t>4/17/2018</a:t>
+              <a:t>5/5/2018</a:t>
             </a:fld>
             <a:endParaRPr lang="en-US" dirty="0"/>
           </a:p>
@@ -5275,7 +5277,7 @@
             <a:fld id="{48A87A34-81AB-432B-8DAE-1953F412C126}" type="datetimeFigureOut">
               <a:rPr lang="en-US" dirty="0"/>
               <a:pPr/>
-              <a:t>4/17/2018</a:t>
+              <a:t>5/5/2018</a:t>
             </a:fld>
             <a:endParaRPr lang="en-US" dirty="0"/>
           </a:p>
@@ -5876,13 +5878,13 @@
   <p:clrMapOvr>
     <a:masterClrMapping/>
   </p:clrMapOvr>
-  <mc:AlternateContent xmlns:mc="http://schemas.openxmlformats.org/markup-compatibility/2006" xmlns:p14="http://schemas.microsoft.com/office/powerpoint/2010/main">
-    <mc:Choice Requires="p14">
+  <mc:AlternateContent xmlns:mc="http://schemas.openxmlformats.org/markup-compatibility/2006">
+    <mc:Choice xmlns:p14="http://schemas.microsoft.com/office/powerpoint/2010/main" Requires="p14">
       <p:transition spd="slow" p14:dur="3400">
         <p14:reveal/>
       </p:transition>
     </mc:Choice>
-    <mc:Fallback xmlns="">
+    <mc:Fallback>
       <p:transition spd="slow">
         <p:fade/>
       </p:transition>
@@ -5910,43 +5912,48 @@
       </p:grpSpPr>
       <p:sp>
         <p:nvSpPr>
-          <p:cNvPr id="2" name="Title 1">
+          <p:cNvPr id="11" name="TextBox 10">
             <a:extLst>
               <a:ext uri="{FF2B5EF4-FFF2-40B4-BE49-F238E27FC236}">
-                <a16:creationId xmlns:a16="http://schemas.microsoft.com/office/drawing/2014/main" id="{CDF1BE2B-057C-4E77-B5D4-A809174377B9}"/>
+                <a16:creationId xmlns:a16="http://schemas.microsoft.com/office/drawing/2014/main" id="{573F684E-E372-4257-9845-4B8186C37FD4}"/>
               </a:ext>
             </a:extLst>
           </p:cNvPr>
-          <p:cNvSpPr>
-            <a:spLocks noGrp="1"/>
-          </p:cNvSpPr>
-          <p:nvPr>
-            <p:ph type="title"/>
-          </p:nvPr>
-        </p:nvSpPr>
-        <p:spPr>
-          <a:xfrm>
-            <a:off x="2365131" y="623695"/>
-            <a:ext cx="7277100" cy="1293028"/>
-          </a:xfrm>
-        </p:spPr>
-        <p:txBody>
-          <a:bodyPr/>
-          <a:lstStyle/>
-          <a:p>
-            <a:r>
-              <a:rPr lang="en-US" dirty="0"/>
-              <a:t>*Special functions used:</a:t>
+          <p:cNvSpPr txBox="1"/>
+          <p:nvPr/>
+        </p:nvSpPr>
+        <p:spPr>
+          <a:xfrm>
+            <a:off x="3420208" y="353528"/>
+            <a:ext cx="4231657" cy="769441"/>
+          </a:xfrm>
+          <a:prstGeom prst="rect">
+            <a:avLst/>
+          </a:prstGeom>
+          <a:noFill/>
+        </p:spPr>
+        <p:txBody>
+          <a:bodyPr wrap="square" rtlCol="0">
+            <a:spAutoFit/>
+          </a:bodyPr>
+          <a:lstStyle/>
+          <a:p>
+            <a:pPr algn="ctr"/>
+            <a:r>
+              <a:rPr lang="en-US" sz="4400" dirty="0">
+                <a:latin typeface="Baskerville Old Face" panose="02020602080505020303" pitchFamily="18" charset="0"/>
+              </a:rPr>
+              <a:t>B. Drop  (       )</a:t>
             </a:r>
           </a:p>
         </p:txBody>
       </p:sp>
       <p:pic>
         <p:nvPicPr>
-          <p:cNvPr id="8" name="Picture 7">
+          <p:cNvPr id="13" name="Picture 12">
             <a:extLst>
               <a:ext uri="{FF2B5EF4-FFF2-40B4-BE49-F238E27FC236}">
-                <a16:creationId xmlns:a16="http://schemas.microsoft.com/office/drawing/2014/main" id="{6C449124-D644-4CA5-B57B-59AEE0311530}"/>
+                <a16:creationId xmlns:a16="http://schemas.microsoft.com/office/drawing/2014/main" id="{531A878C-6F88-4794-B085-FAE175EC20B3}"/>
               </a:ext>
             </a:extLst>
           </p:cNvPr>
@@ -5963,8 +5970,8 @@
         </p:blipFill>
         <p:spPr>
           <a:xfrm>
-            <a:off x="6638139" y="3109188"/>
-            <a:ext cx="4701007" cy="2851996"/>
+            <a:off x="6109343" y="366145"/>
+            <a:ext cx="945563" cy="794273"/>
           </a:xfrm>
           <a:prstGeom prst="rect">
             <a:avLst/>
@@ -5973,10 +5980,10 @@
       </p:pic>
       <p:pic>
         <p:nvPicPr>
-          <p:cNvPr id="10" name="Picture 9">
+          <p:cNvPr id="9" name="Picture 8">
             <a:extLst>
               <a:ext uri="{FF2B5EF4-FFF2-40B4-BE49-F238E27FC236}">
-                <a16:creationId xmlns:a16="http://schemas.microsoft.com/office/drawing/2014/main" id="{0F1ED004-4CDB-41B3-B878-FB87C4C93CA9}"/>
+                <a16:creationId xmlns:a16="http://schemas.microsoft.com/office/drawing/2014/main" id="{E192E7E9-6855-435B-858C-791A20DC694E}"/>
               </a:ext>
             </a:extLst>
           </p:cNvPr>
@@ -5993,111 +6000,91 @@
         </p:blipFill>
         <p:spPr>
           <a:xfrm>
-            <a:off x="685801" y="3109188"/>
-            <a:ext cx="5317880" cy="2851996"/>
+            <a:off x="908" y="1129178"/>
+            <a:ext cx="3419300" cy="1253538"/>
           </a:xfrm>
           <a:prstGeom prst="rect">
             <a:avLst/>
           </a:prstGeom>
         </p:spPr>
       </p:pic>
-      <p:sp>
-        <p:nvSpPr>
-          <p:cNvPr id="11" name="TextBox 10">
+      <p:pic>
+        <p:nvPicPr>
+          <p:cNvPr id="12" name="Picture 11">
             <a:extLst>
               <a:ext uri="{FF2B5EF4-FFF2-40B4-BE49-F238E27FC236}">
-                <a16:creationId xmlns:a16="http://schemas.microsoft.com/office/drawing/2014/main" id="{B31820F8-4DEB-4327-9651-69257C676BF6}"/>
+                <a16:creationId xmlns:a16="http://schemas.microsoft.com/office/drawing/2014/main" id="{9A885DF8-3E04-46B9-A9CA-71192AEE19E0}"/>
               </a:ext>
             </a:extLst>
           </p:cNvPr>
-          <p:cNvSpPr txBox="1"/>
+          <p:cNvPicPr>
+            <a:picLocks noChangeAspect="1"/>
+          </p:cNvPicPr>
           <p:nvPr/>
-        </p:nvSpPr>
-        <p:spPr>
-          <a:xfrm>
-            <a:off x="685801" y="2128235"/>
-            <a:ext cx="2875084" cy="769441"/>
+        </p:nvPicPr>
+        <p:blipFill>
+          <a:blip r:embed="rId4"/>
+          <a:stretch>
+            <a:fillRect/>
+          </a:stretch>
+        </p:blipFill>
+        <p:spPr>
+          <a:xfrm>
+            <a:off x="4470170" y="1154009"/>
+            <a:ext cx="7721830" cy="5185245"/>
           </a:xfrm>
           <a:prstGeom prst="rect">
             <a:avLst/>
           </a:prstGeom>
-          <a:noFill/>
-        </p:spPr>
-        <p:txBody>
-          <a:bodyPr wrap="square" rtlCol="0">
-            <a:spAutoFit/>
-          </a:bodyPr>
-          <a:lstStyle/>
-          <a:p>
-            <a:r>
-              <a:rPr lang="en-US" sz="4400" dirty="0" err="1">
-                <a:latin typeface="Baskerville Old Face" panose="02020602080505020303" pitchFamily="18" charset="0"/>
-              </a:rPr>
-              <a:t>Gotoxy</a:t>
-            </a:r>
-            <a:r>
-              <a:rPr lang="en-US" sz="4400" dirty="0">
-                <a:latin typeface="Baskerville Old Face" panose="02020602080505020303" pitchFamily="18" charset="0"/>
-              </a:rPr>
-              <a:t>:</a:t>
-            </a:r>
-          </a:p>
-        </p:txBody>
-      </p:sp>
-      <p:sp>
-        <p:nvSpPr>
-          <p:cNvPr id="12" name="TextBox 11">
+        </p:spPr>
+      </p:pic>
+      <p:pic>
+        <p:nvPicPr>
+          <p:cNvPr id="16" name="Picture 15">
             <a:extLst>
               <a:ext uri="{FF2B5EF4-FFF2-40B4-BE49-F238E27FC236}">
-                <a16:creationId xmlns:a16="http://schemas.microsoft.com/office/drawing/2014/main" id="{55C8CB0C-94FA-40B3-951D-495E1C592888}"/>
+                <a16:creationId xmlns:a16="http://schemas.microsoft.com/office/drawing/2014/main" id="{0472C88F-3E6B-4FF7-80D8-92DAA445AB0A}"/>
               </a:ext>
             </a:extLst>
           </p:cNvPr>
-          <p:cNvSpPr txBox="1"/>
+          <p:cNvPicPr>
+            <a:picLocks noChangeAspect="1"/>
+          </p:cNvPicPr>
           <p:nvPr/>
-        </p:nvSpPr>
-        <p:spPr>
-          <a:xfrm>
-            <a:off x="6381751" y="2251345"/>
-            <a:ext cx="6188319" cy="646331"/>
+        </p:nvPicPr>
+        <p:blipFill>
+          <a:blip r:embed="rId5"/>
+          <a:stretch>
+            <a:fillRect/>
+          </a:stretch>
+        </p:blipFill>
+        <p:spPr>
+          <a:xfrm>
+            <a:off x="0" y="2395133"/>
+            <a:ext cx="4470170" cy="3944121"/>
           </a:xfrm>
           <a:prstGeom prst="rect">
             <a:avLst/>
           </a:prstGeom>
-          <a:noFill/>
-        </p:spPr>
-        <p:txBody>
-          <a:bodyPr wrap="square" rtlCol="0">
-            <a:spAutoFit/>
-          </a:bodyPr>
-          <a:lstStyle/>
-          <a:p>
-            <a:r>
-              <a:rPr lang="en-US" sz="3600" dirty="0">
-                <a:latin typeface="Baskerville Old Face" panose="02020602080505020303" pitchFamily="18" charset="0"/>
-              </a:rPr>
-              <a:t>To clear the screen of Console:</a:t>
-            </a:r>
-          </a:p>
-        </p:txBody>
-      </p:sp>
+        </p:spPr>
+      </p:pic>
     </p:spTree>
     <p:extLst>
       <p:ext uri="{BB962C8B-B14F-4D97-AF65-F5344CB8AC3E}">
-        <p14:creationId xmlns:p14="http://schemas.microsoft.com/office/powerpoint/2010/main" val="3155142552"/>
+        <p14:creationId xmlns:p14="http://schemas.microsoft.com/office/powerpoint/2010/main" val="1726096973"/>
       </p:ext>
     </p:extLst>
   </p:cSld>
   <p:clrMapOvr>
     <a:masterClrMapping/>
   </p:clrMapOvr>
-  <mc:AlternateContent xmlns:mc="http://schemas.openxmlformats.org/markup-compatibility/2006" xmlns:p159="http://schemas.microsoft.com/office/powerpoint/2015/09/main">
-    <mc:Choice Requires="p159">
-      <p:transition xmlns:p14="http://schemas.microsoft.com/office/powerpoint/2010/main" spd="slow" p14:dur="2000">
-        <p159:morph option="byObject"/>
+  <mc:AlternateContent xmlns:mc="http://schemas.openxmlformats.org/markup-compatibility/2006">
+    <mc:Choice xmlns:p14="http://schemas.microsoft.com/office/powerpoint/2010/main" Requires="p14">
+      <p:transition spd="slow" p14:dur="900">
+        <p14:warp dir="in"/>
       </p:transition>
     </mc:Choice>
-    <mc:Fallback xmlns="">
+    <mc:Fallback>
       <p:transition spd="slow">
         <p:fade/>
       </p:transition>
@@ -6128,7 +6115,7 @@
           <p:cNvPr id="2" name="Title 1">
             <a:extLst>
               <a:ext uri="{FF2B5EF4-FFF2-40B4-BE49-F238E27FC236}">
-                <a16:creationId xmlns:a16="http://schemas.microsoft.com/office/drawing/2014/main" id="{38FACB67-1319-4D4B-BDBB-947D2177E5EF}"/>
+                <a16:creationId xmlns:a16="http://schemas.microsoft.com/office/drawing/2014/main" id="{CDF1BE2B-057C-4E77-B5D4-A809174377B9}"/>
               </a:ext>
             </a:extLst>
           </p:cNvPr>
@@ -6141,71 +6128,108 @@
         </p:nvSpPr>
         <p:spPr>
           <a:xfrm>
-            <a:off x="4157936" y="0"/>
-            <a:ext cx="3153507" cy="1303867"/>
-          </a:xfrm>
-        </p:spPr>
-        <p:txBody>
-          <a:bodyPr>
-            <a:normAutofit/>
-          </a:bodyPr>
-          <a:lstStyle/>
-          <a:p>
-            <a:r>
-              <a:rPr lang="en-US" sz="4400" dirty="0"/>
-              <a:t>6. Result</a:t>
-            </a:r>
-          </a:p>
-        </p:txBody>
-      </p:sp>
-      <p:sp>
-        <p:nvSpPr>
-          <p:cNvPr id="11" name="Text Placeholder 10">
+            <a:off x="2365131" y="623695"/>
+            <a:ext cx="7277100" cy="1293028"/>
+          </a:xfrm>
+        </p:spPr>
+        <p:txBody>
+          <a:bodyPr/>
+          <a:lstStyle/>
+          <a:p>
+            <a:r>
+              <a:rPr lang="en-US" dirty="0"/>
+              <a:t>*Special functions used:</a:t>
+            </a:r>
+          </a:p>
+        </p:txBody>
+      </p:sp>
+      <p:sp>
+        <p:nvSpPr>
+          <p:cNvPr id="11" name="TextBox 10">
             <a:extLst>
               <a:ext uri="{FF2B5EF4-FFF2-40B4-BE49-F238E27FC236}">
-                <a16:creationId xmlns:a16="http://schemas.microsoft.com/office/drawing/2014/main" id="{32FEB57E-AE7A-4245-BE89-5FB236A8F10C}"/>
+                <a16:creationId xmlns:a16="http://schemas.microsoft.com/office/drawing/2014/main" id="{B31820F8-4DEB-4327-9651-69257C676BF6}"/>
               </a:ext>
             </a:extLst>
           </p:cNvPr>
-          <p:cNvSpPr>
-            <a:spLocks noGrp="1"/>
-          </p:cNvSpPr>
-          <p:nvPr>
-            <p:ph type="body" idx="1"/>
-          </p:nvPr>
-        </p:nvSpPr>
-        <p:spPr>
-          <a:xfrm>
-            <a:off x="912107" y="955527"/>
-            <a:ext cx="3882316" cy="617320"/>
-          </a:xfrm>
-        </p:spPr>
-        <p:txBody>
-          <a:bodyPr/>
-          <a:lstStyle/>
-          <a:p>
-            <a:r>
-              <a:rPr lang="en-US" sz="3600" dirty="0"/>
-              <a:t>Basic Output:</a:t>
+          <p:cNvSpPr txBox="1"/>
+          <p:nvPr/>
+        </p:nvSpPr>
+        <p:spPr>
+          <a:xfrm>
+            <a:off x="685801" y="2128235"/>
+            <a:ext cx="2875084" cy="769441"/>
+          </a:xfrm>
+          <a:prstGeom prst="rect">
+            <a:avLst/>
+          </a:prstGeom>
+          <a:noFill/>
+        </p:spPr>
+        <p:txBody>
+          <a:bodyPr wrap="square" rtlCol="0">
+            <a:spAutoFit/>
+          </a:bodyPr>
+          <a:lstStyle/>
+          <a:p>
+            <a:r>
+              <a:rPr lang="en-US" sz="4400" dirty="0">
+                <a:latin typeface="Baskerville Old Face" panose="02020602080505020303" pitchFamily="18" charset="0"/>
+              </a:rPr>
+              <a:t>gotoxy():</a:t>
+            </a:r>
+          </a:p>
+        </p:txBody>
+      </p:sp>
+      <p:sp>
+        <p:nvSpPr>
+          <p:cNvPr id="12" name="TextBox 11">
+            <a:extLst>
+              <a:ext uri="{FF2B5EF4-FFF2-40B4-BE49-F238E27FC236}">
+                <a16:creationId xmlns:a16="http://schemas.microsoft.com/office/drawing/2014/main" id="{55C8CB0C-94FA-40B3-951D-495E1C592888}"/>
+              </a:ext>
+            </a:extLst>
+          </p:cNvPr>
+          <p:cNvSpPr txBox="1"/>
+          <p:nvPr/>
+        </p:nvSpPr>
+        <p:spPr>
+          <a:xfrm>
+            <a:off x="6381751" y="2251345"/>
+            <a:ext cx="6188319" cy="646331"/>
+          </a:xfrm>
+          <a:prstGeom prst="rect">
+            <a:avLst/>
+          </a:prstGeom>
+          <a:noFill/>
+        </p:spPr>
+        <p:txBody>
+          <a:bodyPr wrap="square" rtlCol="0">
+            <a:spAutoFit/>
+          </a:bodyPr>
+          <a:lstStyle/>
+          <a:p>
+            <a:r>
+              <a:rPr lang="en-US" sz="3600" dirty="0">
+                <a:latin typeface="Baskerville Old Face" panose="02020602080505020303" pitchFamily="18" charset="0"/>
+              </a:rPr>
+              <a:t>To clear the screen of Console:</a:t>
             </a:r>
           </a:p>
         </p:txBody>
       </p:sp>
       <p:pic>
         <p:nvPicPr>
-          <p:cNvPr id="6" name="Content Placeholder 5">
+          <p:cNvPr id="4" name="Picture 3">
             <a:extLst>
               <a:ext uri="{FF2B5EF4-FFF2-40B4-BE49-F238E27FC236}">
-                <a16:creationId xmlns:a16="http://schemas.microsoft.com/office/drawing/2014/main" id="{5E799BC3-94C4-44CE-9FD9-DDC1C8257939}"/>
+                <a16:creationId xmlns:a16="http://schemas.microsoft.com/office/drawing/2014/main" id="{9C5BA569-2E0E-497B-B069-3D12B8034864}"/>
               </a:ext>
             </a:extLst>
           </p:cNvPr>
           <p:cNvPicPr>
-            <a:picLocks noGrp="1" noChangeAspect="1"/>
+            <a:picLocks noChangeAspect="1"/>
           </p:cNvPicPr>
-          <p:nvPr>
-            <p:ph sz="half" idx="4294967295"/>
-          </p:nvPr>
+          <p:nvPr/>
         </p:nvPicPr>
         <p:blipFill>
           <a:blip r:embed="rId2"/>
@@ -6215,28 +6239,61 @@
         </p:blipFill>
         <p:spPr>
           <a:xfrm>
-            <a:off x="912107" y="1572847"/>
-            <a:ext cx="10324461" cy="4853824"/>
-          </a:xfrm>
+            <a:off x="725144" y="2897676"/>
+            <a:ext cx="5153496" cy="2526681"/>
+          </a:xfrm>
+          <a:prstGeom prst="rect">
+            <a:avLst/>
+          </a:prstGeom>
+        </p:spPr>
+      </p:pic>
+      <p:pic>
+        <p:nvPicPr>
+          <p:cNvPr id="6" name="Picture 5">
+            <a:extLst>
+              <a:ext uri="{FF2B5EF4-FFF2-40B4-BE49-F238E27FC236}">
+                <a16:creationId xmlns:a16="http://schemas.microsoft.com/office/drawing/2014/main" id="{B0D2E7A9-921E-405B-8183-3B8607642C55}"/>
+              </a:ext>
+            </a:extLst>
+          </p:cNvPr>
+          <p:cNvPicPr>
+            <a:picLocks noChangeAspect="1"/>
+          </p:cNvPicPr>
+          <p:nvPr/>
+        </p:nvPicPr>
+        <p:blipFill>
+          <a:blip r:embed="rId3"/>
+          <a:stretch>
+            <a:fillRect/>
+          </a:stretch>
+        </p:blipFill>
+        <p:spPr>
+          <a:xfrm>
+            <a:off x="6381751" y="2866505"/>
+            <a:ext cx="5685208" cy="2557851"/>
+          </a:xfrm>
+          <a:prstGeom prst="rect">
+            <a:avLst/>
+          </a:prstGeom>
         </p:spPr>
       </p:pic>
     </p:spTree>
     <p:extLst>
       <p:ext uri="{BB962C8B-B14F-4D97-AF65-F5344CB8AC3E}">
-        <p14:creationId xmlns:p14="http://schemas.microsoft.com/office/powerpoint/2010/main" val="2054772901"/>
+        <p14:creationId xmlns:p14="http://schemas.microsoft.com/office/powerpoint/2010/main" val="3155142552"/>
       </p:ext>
     </p:extLst>
   </p:cSld>
   <p:clrMapOvr>
     <a:masterClrMapping/>
   </p:clrMapOvr>
-  <mc:AlternateContent xmlns:mc="http://schemas.openxmlformats.org/markup-compatibility/2006" xmlns:p159="http://schemas.microsoft.com/office/powerpoint/2015/09/main">
-    <mc:Choice Requires="p159">
-      <p:transition xmlns:p14="http://schemas.microsoft.com/office/powerpoint/2010/main" spd="slow" p14:dur="2000">
-        <p159:morph option="byObject"/>
+  <mc:AlternateContent xmlns:mc="http://schemas.openxmlformats.org/markup-compatibility/2006">
+    <mc:Choice xmlns:p14="http://schemas.microsoft.com/office/powerpoint/2010/main" Requires="p14">
+      <p:transition spd="slow" p14:dur="1200">
+        <p14:prism/>
       </p:transition>
     </mc:Choice>
-    <mc:Fallback xmlns="">
+    <mc:Fallback>
       <p:transition spd="slow">
         <p:fade/>
       </p:transition>
@@ -6264,86 +6321,133 @@
       </p:grpSpPr>
       <p:sp>
         <p:nvSpPr>
-          <p:cNvPr id="11" name="TextBox 10">
+          <p:cNvPr id="2" name="Title 1">
             <a:extLst>
               <a:ext uri="{FF2B5EF4-FFF2-40B4-BE49-F238E27FC236}">
-                <a16:creationId xmlns:a16="http://schemas.microsoft.com/office/drawing/2014/main" id="{C5BB3922-2C3E-4D22-9F75-3D905D471CA1}"/>
+                <a16:creationId xmlns:a16="http://schemas.microsoft.com/office/drawing/2014/main" id="{38FACB67-1319-4D4B-BDBB-947D2177E5EF}"/>
               </a:ext>
             </a:extLst>
           </p:cNvPr>
-          <p:cNvSpPr txBox="1"/>
+          <p:cNvSpPr>
+            <a:spLocks noGrp="1"/>
+          </p:cNvSpPr>
+          <p:nvPr>
+            <p:ph type="title"/>
+          </p:nvPr>
+        </p:nvSpPr>
+        <p:spPr>
+          <a:xfrm>
+            <a:off x="4157936" y="0"/>
+            <a:ext cx="3561710" cy="1303867"/>
+          </a:xfrm>
+        </p:spPr>
+        <p:txBody>
+          <a:bodyPr>
+            <a:normAutofit/>
+          </a:bodyPr>
+          <a:lstStyle/>
+          <a:p>
+            <a:pPr algn="ctr"/>
+            <a:r>
+              <a:rPr lang="en-US" sz="4400" dirty="0"/>
+              <a:t>   6. Result</a:t>
+            </a:r>
+          </a:p>
+        </p:txBody>
+      </p:sp>
+      <p:sp>
+        <p:nvSpPr>
+          <p:cNvPr id="11" name="Text Placeholder 10">
+            <a:extLst>
+              <a:ext uri="{FF2B5EF4-FFF2-40B4-BE49-F238E27FC236}">
+                <a16:creationId xmlns:a16="http://schemas.microsoft.com/office/drawing/2014/main" id="{32FEB57E-AE7A-4245-BE89-5FB236A8F10C}"/>
+              </a:ext>
+            </a:extLst>
+          </p:cNvPr>
+          <p:cNvSpPr>
+            <a:spLocks noGrp="1"/>
+          </p:cNvSpPr>
+          <p:nvPr>
+            <p:ph type="body" idx="1"/>
+          </p:nvPr>
+        </p:nvSpPr>
+        <p:spPr>
+          <a:xfrm>
+            <a:off x="4237019" y="1096204"/>
+            <a:ext cx="3882316" cy="617320"/>
+          </a:xfrm>
+        </p:spPr>
+        <p:txBody>
+          <a:bodyPr/>
+          <a:lstStyle/>
+          <a:p>
+            <a:pPr algn="ctr"/>
+            <a:r>
+              <a:rPr lang="en-US" sz="3600" dirty="0"/>
+              <a:t>Basic Output:</a:t>
+            </a:r>
+          </a:p>
+        </p:txBody>
+      </p:sp>
+      <p:pic>
+        <p:nvPicPr>
+          <p:cNvPr id="5" name="Picture 4" descr="C:\Users\Kaushik\AppData\Local\Microsoft\Windows\INetCache\Content.Word\basic op.png">
+            <a:extLst>
+              <a:ext uri="{FF2B5EF4-FFF2-40B4-BE49-F238E27FC236}">
+                <a16:creationId xmlns:a16="http://schemas.microsoft.com/office/drawing/2014/main" id="{1D6B8226-EDA6-41D1-9166-E59D191F3E3A}"/>
+              </a:ext>
+            </a:extLst>
+          </p:cNvPr>
+          <p:cNvPicPr/>
           <p:nvPr/>
-        </p:nvSpPr>
-        <p:spPr>
-          <a:xfrm>
-            <a:off x="4670665" y="446061"/>
-            <a:ext cx="4640201" cy="830997"/>
+        </p:nvPicPr>
+        <p:blipFill rotWithShape="1">
+          <a:blip r:embed="rId2">
+            <a:extLst>
+              <a:ext uri="{28A0092B-C50C-407E-A947-70E740481C1C}">
+                <a14:useLocalDpi xmlns:a14="http://schemas.microsoft.com/office/drawing/2010/main" val="0"/>
+              </a:ext>
+            </a:extLst>
+          </a:blip>
+          <a:srcRect l="-173" t="-555" r="-1"/>
+          <a:stretch/>
+        </p:blipFill>
+        <p:spPr bwMode="auto">
+          <a:xfrm>
+            <a:off x="1207709" y="1713524"/>
+            <a:ext cx="9940937" cy="4775199"/>
           </a:xfrm>
           <a:prstGeom prst="rect">
             <a:avLst/>
           </a:prstGeom>
           <a:noFill/>
-        </p:spPr>
-        <p:txBody>
-          <a:bodyPr wrap="square" rtlCol="0">
-            <a:spAutoFit/>
-          </a:bodyPr>
-          <a:lstStyle/>
-          <a:p>
-            <a:r>
-              <a:rPr lang="en-US" sz="4800" dirty="0"/>
-              <a:t>Lives Lost:</a:t>
-            </a:r>
-          </a:p>
-        </p:txBody>
-      </p:sp>
-      <p:pic>
-        <p:nvPicPr>
-          <p:cNvPr id="13" name="Picture 12">
-            <a:extLst>
-              <a:ext uri="{FF2B5EF4-FFF2-40B4-BE49-F238E27FC236}">
-                <a16:creationId xmlns:a16="http://schemas.microsoft.com/office/drawing/2014/main" id="{D1036673-42EA-4306-986A-8E1FCC03FB2D}"/>
-              </a:ext>
-            </a:extLst>
-          </p:cNvPr>
-          <p:cNvPicPr>
-            <a:picLocks noChangeAspect="1"/>
-          </p:cNvPicPr>
-          <p:nvPr/>
-        </p:nvPicPr>
-        <p:blipFill>
-          <a:blip r:embed="rId2"/>
-          <a:stretch>
-            <a:fillRect/>
-          </a:stretch>
-        </p:blipFill>
-        <p:spPr>
-          <a:xfrm>
-            <a:off x="713646" y="1277058"/>
-            <a:ext cx="10833086" cy="5396116"/>
-          </a:xfrm>
-          <a:prstGeom prst="rect">
-            <a:avLst/>
-          </a:prstGeom>
+          <a:ln>
+            <a:noFill/>
+          </a:ln>
+          <a:extLst>
+            <a:ext uri="{53640926-AAD7-44D8-BBD7-CCE9431645EC}">
+              <a14:shadowObscured xmlns:a14="http://schemas.microsoft.com/office/drawing/2010/main"/>
+            </a:ext>
+          </a:extLst>
         </p:spPr>
       </p:pic>
     </p:spTree>
     <p:extLst>
       <p:ext uri="{BB962C8B-B14F-4D97-AF65-F5344CB8AC3E}">
-        <p14:creationId xmlns:p14="http://schemas.microsoft.com/office/powerpoint/2010/main" val="4018407693"/>
+        <p14:creationId xmlns:p14="http://schemas.microsoft.com/office/powerpoint/2010/main" val="2054772901"/>
       </p:ext>
     </p:extLst>
   </p:cSld>
   <p:clrMapOvr>
     <a:masterClrMapping/>
   </p:clrMapOvr>
-  <mc:AlternateContent xmlns:mc="http://schemas.openxmlformats.org/markup-compatibility/2006" xmlns:p159="http://schemas.microsoft.com/office/powerpoint/2015/09/main">
-    <mc:Choice Requires="p159">
-      <p:transition xmlns:p14="http://schemas.microsoft.com/office/powerpoint/2010/main" spd="slow" p14:dur="2000">
-        <p159:morph option="byObject"/>
+  <mc:AlternateContent xmlns:mc="http://schemas.openxmlformats.org/markup-compatibility/2006">
+    <mc:Choice xmlns:p14="http://schemas.microsoft.com/office/powerpoint/2010/main" Requires="p14">
+      <p:transition spd="slow" p14:dur="1200">
+        <p14:prism/>
       </p:transition>
     </mc:Choice>
-    <mc:Fallback xmlns="">
+    <mc:Fallback>
       <p:transition spd="slow">
         <p:fade/>
       </p:transition>
@@ -6369,36 +6473,6 @@
           <a:chExt cx="0" cy="0"/>
         </a:xfrm>
       </p:grpSpPr>
-      <p:pic>
-        <p:nvPicPr>
-          <p:cNvPr id="10" name="Picture 9">
-            <a:extLst>
-              <a:ext uri="{FF2B5EF4-FFF2-40B4-BE49-F238E27FC236}">
-                <a16:creationId xmlns:a16="http://schemas.microsoft.com/office/drawing/2014/main" id="{C1EE6DDB-A9CE-4835-BBF4-5752C6B8C348}"/>
-              </a:ext>
-            </a:extLst>
-          </p:cNvPr>
-          <p:cNvPicPr>
-            <a:picLocks noChangeAspect="1"/>
-          </p:cNvPicPr>
-          <p:nvPr/>
-        </p:nvPicPr>
-        <p:blipFill>
-          <a:blip r:embed="rId2"/>
-          <a:stretch>
-            <a:fillRect/>
-          </a:stretch>
-        </p:blipFill>
-        <p:spPr>
-          <a:xfrm>
-            <a:off x="718345" y="1365848"/>
-            <a:ext cx="10781993" cy="5307514"/>
-          </a:xfrm>
-          <a:prstGeom prst="rect">
-            <a:avLst/>
-          </a:prstGeom>
-        </p:spPr>
-      </p:pic>
       <p:sp>
         <p:nvSpPr>
           <p:cNvPr id="11" name="TextBox 10">
@@ -6413,7 +6487,7 @@
         </p:nvSpPr>
         <p:spPr>
           <a:xfrm>
-            <a:off x="4835771" y="539371"/>
+            <a:off x="3638305" y="442655"/>
             <a:ext cx="4721469" cy="826477"/>
           </a:xfrm>
           <a:prstGeom prst="rect">
@@ -6427,6 +6501,7 @@
           </a:bodyPr>
           <a:lstStyle/>
           <a:p>
+            <a:pPr algn="ctr"/>
             <a:r>
               <a:rPr lang="en-US" sz="4800" dirty="0"/>
               <a:t>Scoring:</a:t>
@@ -6434,6 +6509,43 @@
           </a:p>
         </p:txBody>
       </p:sp>
+      <p:pic>
+        <p:nvPicPr>
+          <p:cNvPr id="4" name="Picture 3" descr="C:\Users\Kaushik\AppData\Local\Microsoft\Windows\INetCache\Content.Word\Score.png">
+            <a:extLst>
+              <a:ext uri="{FF2B5EF4-FFF2-40B4-BE49-F238E27FC236}">
+                <a16:creationId xmlns:a16="http://schemas.microsoft.com/office/drawing/2014/main" id="{7A324A7D-77FC-459B-B830-6303A5B6A8AA}"/>
+              </a:ext>
+            </a:extLst>
+          </p:cNvPr>
+          <p:cNvPicPr/>
+          <p:nvPr/>
+        </p:nvPicPr>
+        <p:blipFill rotWithShape="1">
+          <a:blip r:embed="rId2">
+            <a:extLst>
+              <a:ext uri="{28A0092B-C50C-407E-A947-70E740481C1C}">
+                <a14:useLocalDpi xmlns:a14="http://schemas.microsoft.com/office/drawing/2010/main" val="0"/>
+              </a:ext>
+            </a:extLst>
+          </a:blip>
+          <a:srcRect r="460"/>
+          <a:stretch/>
+        </p:blipFill>
+        <p:spPr bwMode="auto">
+          <a:xfrm>
+            <a:off x="295518" y="1365848"/>
+            <a:ext cx="11407044" cy="5272344"/>
+          </a:xfrm>
+          <a:prstGeom prst="rect">
+            <a:avLst/>
+          </a:prstGeom>
+          <a:noFill/>
+          <a:ln>
+            <a:noFill/>
+          </a:ln>
+        </p:spPr>
+      </p:pic>
     </p:spTree>
     <p:extLst>
       <p:ext uri="{BB962C8B-B14F-4D97-AF65-F5344CB8AC3E}">
@@ -6444,13 +6556,13 @@
   <p:clrMapOvr>
     <a:masterClrMapping/>
   </p:clrMapOvr>
-  <mc:AlternateContent xmlns:mc="http://schemas.openxmlformats.org/markup-compatibility/2006" xmlns:p159="http://schemas.microsoft.com/office/powerpoint/2015/09/main">
-    <mc:Choice Requires="p159">
-      <p:transition xmlns:p14="http://schemas.microsoft.com/office/powerpoint/2010/main" spd="slow" p14:dur="2000">
-        <p159:morph option="byObject"/>
+  <mc:AlternateContent xmlns:mc="http://schemas.openxmlformats.org/markup-compatibility/2006">
+    <mc:Choice xmlns:p14="http://schemas.microsoft.com/office/powerpoint/2010/main" Requires="p14">
+      <p:transition spd="slow" p14:dur="1600">
+        <p14:prism isContent="1" isInverted="1"/>
       </p:transition>
     </mc:Choice>
-    <mc:Fallback xmlns="">
+    <mc:Fallback>
       <p:transition spd="slow">
         <p:fade/>
       </p:transition>
@@ -6478,132 +6590,96 @@
       </p:grpSpPr>
       <p:sp>
         <p:nvSpPr>
-          <p:cNvPr id="2" name="Title 1">
+          <p:cNvPr id="11" name="TextBox 10">
             <a:extLst>
               <a:ext uri="{FF2B5EF4-FFF2-40B4-BE49-F238E27FC236}">
-                <a16:creationId xmlns:a16="http://schemas.microsoft.com/office/drawing/2014/main" id="{B9C7DA99-252D-44F6-87CC-FBA76DDB8BFF}"/>
+                <a16:creationId xmlns:a16="http://schemas.microsoft.com/office/drawing/2014/main" id="{C5BB3922-2C3E-4D22-9F75-3D905D471CA1}"/>
               </a:ext>
             </a:extLst>
           </p:cNvPr>
-          <p:cNvSpPr>
-            <a:spLocks noGrp="1"/>
-          </p:cNvSpPr>
-          <p:nvPr>
-            <p:ph type="title"/>
-          </p:nvPr>
-        </p:nvSpPr>
-        <p:spPr>
-          <a:xfrm>
-            <a:off x="2945423" y="606112"/>
-            <a:ext cx="6934201" cy="1293028"/>
-          </a:xfrm>
-        </p:spPr>
-        <p:txBody>
-          <a:bodyPr/>
-          <a:lstStyle/>
-          <a:p>
-            <a:r>
-              <a:rPr lang="en-US" dirty="0"/>
-              <a:t>7.Future Enhancements</a:t>
-            </a:r>
-          </a:p>
-        </p:txBody>
-      </p:sp>
-      <p:sp>
-        <p:nvSpPr>
-          <p:cNvPr id="9" name="Content Placeholder 8">
+          <p:cNvSpPr txBox="1"/>
+          <p:nvPr/>
+        </p:nvSpPr>
+        <p:spPr>
+          <a:xfrm>
+            <a:off x="3722900" y="472438"/>
+            <a:ext cx="4640201" cy="830997"/>
+          </a:xfrm>
+          <a:prstGeom prst="rect">
+            <a:avLst/>
+          </a:prstGeom>
+          <a:noFill/>
+        </p:spPr>
+        <p:txBody>
+          <a:bodyPr wrap="square" rtlCol="0">
+            <a:spAutoFit/>
+          </a:bodyPr>
+          <a:lstStyle/>
+          <a:p>
+            <a:pPr algn="ctr"/>
+            <a:r>
+              <a:rPr lang="en-US" sz="4800" dirty="0"/>
+              <a:t>Lives Lost:</a:t>
+            </a:r>
+          </a:p>
+        </p:txBody>
+      </p:sp>
+      <p:pic>
+        <p:nvPicPr>
+          <p:cNvPr id="4" name="Picture 3" descr="C:\Users\Kaushik\AppData\Local\Microsoft\Windows\INetCache\Content.Word\lose life.png">
             <a:extLst>
               <a:ext uri="{FF2B5EF4-FFF2-40B4-BE49-F238E27FC236}">
-                <a16:creationId xmlns:a16="http://schemas.microsoft.com/office/drawing/2014/main" id="{D7364DE4-1CDD-4993-84E1-5A9D4F8986B3}"/>
+                <a16:creationId xmlns:a16="http://schemas.microsoft.com/office/drawing/2014/main" id="{B254F2B3-8C99-46BE-BD57-B858536497DB}"/>
               </a:ext>
             </a:extLst>
           </p:cNvPr>
-          <p:cNvSpPr>
-            <a:spLocks noGrp="1"/>
-          </p:cNvSpPr>
-          <p:nvPr>
-            <p:ph idx="1"/>
-          </p:nvPr>
-        </p:nvSpPr>
-        <p:spPr>
-          <a:xfrm>
-            <a:off x="650631" y="2291275"/>
-            <a:ext cx="10820400" cy="4024125"/>
-          </a:xfrm>
-        </p:spPr>
-        <p:txBody>
-          <a:bodyPr>
-            <a:normAutofit lnSpcReduction="10000"/>
-          </a:bodyPr>
-          <a:lstStyle/>
-          <a:p>
-            <a:r>
-              <a:rPr lang="en-US" sz="3200" dirty="0"/>
-              <a:t>This project can be implemented by using graphics.</a:t>
-            </a:r>
-          </a:p>
-          <a:p>
-            <a:r>
-              <a:rPr lang="en-US" sz="3200" dirty="0"/>
-              <a:t>Project can be updated and reprogrammed to be released as an </a:t>
-            </a:r>
-            <a:r>
-              <a:rPr lang="en-US" sz="3200" b="1" dirty="0"/>
-              <a:t>Android</a:t>
-            </a:r>
-            <a:r>
-              <a:rPr lang="en-US" sz="3200" dirty="0"/>
-              <a:t> application.</a:t>
-            </a:r>
-          </a:p>
-          <a:p>
-            <a:r>
-              <a:rPr lang="en-US" sz="3200" dirty="0"/>
-              <a:t>A better and faster algorithm can be used for drops.</a:t>
-            </a:r>
-          </a:p>
-          <a:p>
-            <a:r>
-              <a:rPr lang="en-US" sz="3200" dirty="0"/>
-              <a:t>Multiple levels can be implemented.</a:t>
-            </a:r>
-          </a:p>
-          <a:p>
-            <a:r>
-              <a:rPr lang="en-US" sz="3200" dirty="0"/>
-              <a:t>A new set of controls can be used for the movement of  “Container”. </a:t>
-            </a:r>
-            <a:br>
-              <a:rPr lang="en-US" sz="3200" dirty="0"/>
-            </a:br>
-            <a:r>
-              <a:rPr lang="en-US" sz="3200" dirty="0" err="1"/>
-              <a:t>e.g</a:t>
-            </a:r>
-            <a:r>
-              <a:rPr lang="en-US" sz="3200" dirty="0"/>
-              <a:t>: Mouse motion control, Joystick.</a:t>
-            </a:r>
-          </a:p>
-        </p:txBody>
-      </p:sp>
+          <p:cNvPicPr/>
+          <p:nvPr/>
+        </p:nvPicPr>
+        <p:blipFill>
+          <a:blip r:embed="rId2">
+            <a:extLst>
+              <a:ext uri="{28A0092B-C50C-407E-A947-70E740481C1C}">
+                <a14:useLocalDpi xmlns:a14="http://schemas.microsoft.com/office/drawing/2010/main" val="0"/>
+              </a:ext>
+            </a:extLst>
+          </a:blip>
+          <a:srcRect/>
+          <a:stretch>
+            <a:fillRect/>
+          </a:stretch>
+        </p:blipFill>
+        <p:spPr bwMode="auto">
+          <a:xfrm>
+            <a:off x="612041" y="1417734"/>
+            <a:ext cx="10861920" cy="5238042"/>
+          </a:xfrm>
+          <a:prstGeom prst="rect">
+            <a:avLst/>
+          </a:prstGeom>
+          <a:noFill/>
+          <a:ln>
+            <a:noFill/>
+          </a:ln>
+        </p:spPr>
+      </p:pic>
     </p:spTree>
     <p:extLst>
       <p:ext uri="{BB962C8B-B14F-4D97-AF65-F5344CB8AC3E}">
-        <p14:creationId xmlns:p14="http://schemas.microsoft.com/office/powerpoint/2010/main" val="4165689634"/>
+        <p14:creationId xmlns:p14="http://schemas.microsoft.com/office/powerpoint/2010/main" val="4018407693"/>
       </p:ext>
     </p:extLst>
   </p:cSld>
   <p:clrMapOvr>
     <a:masterClrMapping/>
   </p:clrMapOvr>
-  <mc:AlternateContent xmlns:mc="http://schemas.openxmlformats.org/markup-compatibility/2006" xmlns:p159="http://schemas.microsoft.com/office/powerpoint/2015/09/main">
-    <mc:Choice Requires="p159">
-      <p:transition xmlns:p14="http://schemas.microsoft.com/office/powerpoint/2010/main" spd="slow" p14:dur="2000">
-        <p159:morph option="byObject"/>
+  <mc:AlternateContent xmlns:mc="http://schemas.openxmlformats.org/markup-compatibility/2006">
+    <mc:Choice xmlns:p14="http://schemas.microsoft.com/office/powerpoint/2010/main" Requires="p14">
+      <p:transition spd="slow" p14:dur="1600">
+        <p14:prism isContent="1" isInverted="1"/>
       </p:transition>
     </mc:Choice>
-    <mc:Fallback xmlns="">
+    <mc:Fallback>
       <p:transition spd="slow">
         <p:fade/>
       </p:transition>
@@ -6631,192 +6707,94 @@
       </p:grpSpPr>
       <p:sp>
         <p:nvSpPr>
-          <p:cNvPr id="2" name="Title 1">
+          <p:cNvPr id="9" name="TextBox 8">
             <a:extLst>
               <a:ext uri="{FF2B5EF4-FFF2-40B4-BE49-F238E27FC236}">
-                <a16:creationId xmlns:a16="http://schemas.microsoft.com/office/drawing/2014/main" id="{5B10EFEF-A5CA-4D88-A0D0-5B595051C9D5}"/>
+                <a16:creationId xmlns:a16="http://schemas.microsoft.com/office/drawing/2014/main" id="{3971681D-0F61-47A5-807C-8DE2E10FA6A5}"/>
               </a:ext>
             </a:extLst>
           </p:cNvPr>
-          <p:cNvSpPr>
-            <a:spLocks noGrp="1"/>
-          </p:cNvSpPr>
-          <p:nvPr>
-            <p:ph type="title"/>
-          </p:nvPr>
-        </p:nvSpPr>
-        <p:spPr>
-          <a:xfrm>
-            <a:off x="3604846" y="87365"/>
-            <a:ext cx="4406411" cy="1293028"/>
-          </a:xfrm>
-        </p:spPr>
-        <p:txBody>
-          <a:bodyPr>
-            <a:normAutofit fontScale="90000"/>
+          <p:cNvSpPr txBox="1"/>
+          <p:nvPr/>
+        </p:nvSpPr>
+        <p:spPr>
+          <a:xfrm>
+            <a:off x="3242652" y="705224"/>
+            <a:ext cx="5635869" cy="769441"/>
+          </a:xfrm>
+          <a:prstGeom prst="rect">
+            <a:avLst/>
+          </a:prstGeom>
+          <a:noFill/>
+        </p:spPr>
+        <p:txBody>
+          <a:bodyPr wrap="square" rtlCol="0">
+            <a:spAutoFit/>
           </a:bodyPr>
           <a:lstStyle/>
           <a:p>
-            <a:r>
-              <a:rPr lang="en-US" sz="5400" dirty="0"/>
-              <a:t>8.References</a:t>
-            </a:r>
-            <a:endParaRPr lang="en-US" dirty="0"/>
-          </a:p>
-        </p:txBody>
-      </p:sp>
-      <p:sp>
-        <p:nvSpPr>
-          <p:cNvPr id="3" name="Content Placeholder 2">
+            <a:pPr algn="ctr"/>
+            <a:r>
+              <a:rPr lang="en-US" sz="4400" dirty="0"/>
+              <a:t>Game Over:</a:t>
+            </a:r>
+          </a:p>
+        </p:txBody>
+      </p:sp>
+      <p:pic>
+        <p:nvPicPr>
+          <p:cNvPr id="10" name="Picture 9" descr="C:\Users\Kaushik\AppData\Local\Microsoft\Windows\INetCache\Content.Word\Game Over.png">
             <a:extLst>
               <a:ext uri="{FF2B5EF4-FFF2-40B4-BE49-F238E27FC236}">
-                <a16:creationId xmlns:a16="http://schemas.microsoft.com/office/drawing/2014/main" id="{8252D5BF-F24F-48AB-8D80-B5FBE0C6F977}"/>
+                <a16:creationId xmlns:a16="http://schemas.microsoft.com/office/drawing/2014/main" id="{2645350F-FCCE-4F8E-9649-84AB4C8D0FF5}"/>
               </a:ext>
             </a:extLst>
           </p:cNvPr>
-          <p:cNvSpPr>
-            <a:spLocks noGrp="1"/>
-          </p:cNvSpPr>
-          <p:nvPr>
-            <p:ph idx="1"/>
-          </p:nvPr>
-        </p:nvSpPr>
-        <p:spPr>
-          <a:xfrm>
-            <a:off x="685799" y="1406771"/>
-            <a:ext cx="10820400" cy="5143499"/>
-          </a:xfrm>
-        </p:spPr>
-        <p:txBody>
-          <a:bodyPr>
-            <a:normAutofit/>
-          </a:bodyPr>
-          <a:lstStyle/>
-          <a:p>
-            <a:pPr marL="0" indent="0">
-              <a:buNone/>
-            </a:pPr>
-            <a:r>
-              <a:rPr lang="en-US" sz="3200" b="1" dirty="0"/>
-              <a:t>GitHub:</a:t>
-            </a:r>
-          </a:p>
-          <a:p>
-            <a:pPr marL="0" indent="0">
-              <a:buNone/>
-            </a:pPr>
-            <a:r>
-              <a:rPr lang="en-US" sz="3200" b="1" dirty="0">
-                <a:hlinkClick r:id="rId2"/>
-              </a:rPr>
-              <a:t>https://github.com/</a:t>
-            </a:r>
-            <a:endParaRPr lang="en-US" sz="3200" b="1" dirty="0"/>
-          </a:p>
-          <a:p>
-            <a:pPr marL="0" indent="0">
-              <a:buNone/>
-            </a:pPr>
-            <a:r>
-              <a:rPr lang="en-US" sz="3200" b="1" dirty="0" err="1"/>
-              <a:t>Dzone</a:t>
-            </a:r>
-            <a:r>
-              <a:rPr lang="en-US" sz="3200" b="1" dirty="0"/>
-              <a:t>:</a:t>
-            </a:r>
-            <a:endParaRPr lang="en-US" sz="3200" dirty="0"/>
-          </a:p>
-          <a:p>
-            <a:pPr marL="0" indent="0">
-              <a:buNone/>
-            </a:pPr>
-            <a:r>
-              <a:rPr lang="en-US" sz="3200" b="1" dirty="0">
-                <a:hlinkClick r:id="rId3"/>
-              </a:rPr>
-              <a:t>https://dzone.com/</a:t>
-            </a:r>
-            <a:r>
-              <a:rPr lang="en-US" sz="3200" b="1" dirty="0"/>
-              <a:t> </a:t>
-            </a:r>
-          </a:p>
-          <a:p>
-            <a:pPr marL="0" indent="0">
-              <a:buNone/>
-            </a:pPr>
-            <a:r>
-              <a:rPr lang="en-US" sz="3200" b="1" dirty="0" err="1"/>
-              <a:t>Stackoverflow</a:t>
-            </a:r>
-            <a:r>
-              <a:rPr lang="en-US" sz="3200" b="1" dirty="0"/>
-              <a:t>:</a:t>
-            </a:r>
-          </a:p>
-          <a:p>
-            <a:pPr marL="0" indent="0">
-              <a:buNone/>
-            </a:pPr>
-            <a:r>
-              <a:rPr lang="en-US" sz="3200" b="1" dirty="0">
-                <a:hlinkClick r:id="rId4"/>
-              </a:rPr>
-              <a:t>https://stackoverflow.com/</a:t>
-            </a:r>
-            <a:endParaRPr lang="en-US" sz="3200" b="1" dirty="0"/>
-          </a:p>
-          <a:p>
-            <a:pPr marL="0" indent="0">
-              <a:buNone/>
-            </a:pPr>
-            <a:r>
-              <a:rPr lang="en-US" sz="3200" b="1" dirty="0" err="1"/>
-              <a:t>Cppreference</a:t>
-            </a:r>
-            <a:r>
-              <a:rPr lang="en-US" sz="3200" dirty="0"/>
-              <a:t>:</a:t>
-            </a:r>
-          </a:p>
-          <a:p>
-            <a:pPr marL="0" indent="0">
-              <a:buNone/>
-            </a:pPr>
-            <a:r>
-              <a:rPr lang="en-US" sz="3200" b="1" dirty="0">
-                <a:hlinkClick r:id="rId5"/>
-              </a:rPr>
-              <a:t>http://en.cppreference.com/w/</a:t>
-            </a:r>
-            <a:endParaRPr lang="en-US" sz="3200" b="1" dirty="0"/>
-          </a:p>
-          <a:p>
-            <a:pPr marL="0" indent="0">
-              <a:buNone/>
-            </a:pPr>
-            <a:endParaRPr lang="en-US" sz="3200" dirty="0"/>
-          </a:p>
-        </p:txBody>
-      </p:sp>
+          <p:cNvPicPr/>
+          <p:nvPr/>
+        </p:nvPicPr>
+        <p:blipFill rotWithShape="1">
+          <a:blip r:embed="rId2">
+            <a:extLst>
+              <a:ext uri="{28A0092B-C50C-407E-A947-70E740481C1C}">
+                <a14:useLocalDpi xmlns:a14="http://schemas.microsoft.com/office/drawing/2010/main" val="0"/>
+              </a:ext>
+            </a:extLst>
+          </a:blip>
+          <a:srcRect r="703"/>
+          <a:stretch/>
+        </p:blipFill>
+        <p:spPr bwMode="auto">
+          <a:xfrm>
+            <a:off x="471365" y="1474665"/>
+            <a:ext cx="11178444" cy="5181112"/>
+          </a:xfrm>
+          <a:prstGeom prst="rect">
+            <a:avLst/>
+          </a:prstGeom>
+          <a:noFill/>
+          <a:ln>
+            <a:noFill/>
+          </a:ln>
+        </p:spPr>
+      </p:pic>
     </p:spTree>
     <p:extLst>
       <p:ext uri="{BB962C8B-B14F-4D97-AF65-F5344CB8AC3E}">
-        <p14:creationId xmlns:p14="http://schemas.microsoft.com/office/powerpoint/2010/main" val="3329216113"/>
+        <p14:creationId xmlns:p14="http://schemas.microsoft.com/office/powerpoint/2010/main" val="2427169521"/>
       </p:ext>
     </p:extLst>
   </p:cSld>
   <p:clrMapOvr>
     <a:masterClrMapping/>
   </p:clrMapOvr>
-  <mc:AlternateContent xmlns:mc="http://schemas.openxmlformats.org/markup-compatibility/2006" xmlns:p159="http://schemas.microsoft.com/office/powerpoint/2015/09/main">
-    <mc:Choice Requires="p159">
-      <p:transition xmlns:p14="http://schemas.microsoft.com/office/powerpoint/2010/main" spd="slow" p14:dur="2000">
-        <p159:morph option="byObject"/>
+  <mc:AlternateContent xmlns:mc="http://schemas.openxmlformats.org/markup-compatibility/2006">
+    <mc:Choice xmlns:p14="http://schemas.microsoft.com/office/powerpoint/2010/main" Requires="p14">
+      <p:transition spd="slow" p14:dur="1600">
+        <p14:prism isContent="1" isInverted="1"/>
       </p:transition>
     </mc:Choice>
-    <mc:Fallback xmlns="">
+    <mc:Fallback>
       <p:transition spd="slow">
         <p:fade/>
       </p:transition>
@@ -6847,6 +6825,372 @@
           <p:cNvPr id="2" name="Title 1">
             <a:extLst>
               <a:ext uri="{FF2B5EF4-FFF2-40B4-BE49-F238E27FC236}">
+                <a16:creationId xmlns:a16="http://schemas.microsoft.com/office/drawing/2014/main" id="{B9C7DA99-252D-44F6-87CC-FBA76DDB8BFF}"/>
+              </a:ext>
+            </a:extLst>
+          </p:cNvPr>
+          <p:cNvSpPr>
+            <a:spLocks noGrp="1"/>
+          </p:cNvSpPr>
+          <p:nvPr>
+            <p:ph type="title"/>
+          </p:nvPr>
+        </p:nvSpPr>
+        <p:spPr>
+          <a:xfrm>
+            <a:off x="2945423" y="606112"/>
+            <a:ext cx="6934201" cy="1293028"/>
+          </a:xfrm>
+        </p:spPr>
+        <p:txBody>
+          <a:bodyPr/>
+          <a:lstStyle/>
+          <a:p>
+            <a:r>
+              <a:rPr lang="en-US" dirty="0"/>
+              <a:t>7.Future Enhancements</a:t>
+            </a:r>
+          </a:p>
+        </p:txBody>
+      </p:sp>
+      <p:sp>
+        <p:nvSpPr>
+          <p:cNvPr id="9" name="Content Placeholder 8">
+            <a:extLst>
+              <a:ext uri="{FF2B5EF4-FFF2-40B4-BE49-F238E27FC236}">
+                <a16:creationId xmlns:a16="http://schemas.microsoft.com/office/drawing/2014/main" id="{D7364DE4-1CDD-4993-84E1-5A9D4F8986B3}"/>
+              </a:ext>
+            </a:extLst>
+          </p:cNvPr>
+          <p:cNvSpPr>
+            <a:spLocks noGrp="1"/>
+          </p:cNvSpPr>
+          <p:nvPr>
+            <p:ph idx="1"/>
+          </p:nvPr>
+        </p:nvSpPr>
+        <p:spPr>
+          <a:xfrm>
+            <a:off x="650631" y="2291275"/>
+            <a:ext cx="10820400" cy="4024125"/>
+          </a:xfrm>
+        </p:spPr>
+        <p:txBody>
+          <a:bodyPr>
+            <a:normAutofit lnSpcReduction="10000"/>
+          </a:bodyPr>
+          <a:lstStyle/>
+          <a:p>
+            <a:r>
+              <a:rPr lang="en-US" sz="3200" dirty="0"/>
+              <a:t>This project can be implemented by using graphics.</a:t>
+            </a:r>
+          </a:p>
+          <a:p>
+            <a:r>
+              <a:rPr lang="en-US" sz="3200" dirty="0"/>
+              <a:t>Project can be updated and reprogrammed to be released as an </a:t>
+            </a:r>
+            <a:r>
+              <a:rPr lang="en-US" sz="3200" b="1" dirty="0"/>
+              <a:t>Android</a:t>
+            </a:r>
+            <a:r>
+              <a:rPr lang="en-US" sz="3200" dirty="0"/>
+              <a:t> application.</a:t>
+            </a:r>
+          </a:p>
+          <a:p>
+            <a:r>
+              <a:rPr lang="en-US" sz="3200" dirty="0"/>
+              <a:t>A better and faster algorithm can be used for drops.</a:t>
+            </a:r>
+          </a:p>
+          <a:p>
+            <a:r>
+              <a:rPr lang="en-US" sz="3200" dirty="0"/>
+              <a:t>Multiple levels can be implemented.</a:t>
+            </a:r>
+          </a:p>
+          <a:p>
+            <a:r>
+              <a:rPr lang="en-US" sz="3200" dirty="0"/>
+              <a:t>A new set of controls can be used for the movement of  “Container”. </a:t>
+            </a:r>
+            <a:br>
+              <a:rPr lang="en-US" sz="3200" dirty="0"/>
+            </a:br>
+            <a:r>
+              <a:rPr lang="en-US" sz="3200" dirty="0" err="1"/>
+              <a:t>e.g</a:t>
+            </a:r>
+            <a:r>
+              <a:rPr lang="en-US" sz="3200" dirty="0"/>
+              <a:t>: Mouse motion control, Joystick.</a:t>
+            </a:r>
+          </a:p>
+        </p:txBody>
+      </p:sp>
+    </p:spTree>
+    <p:extLst>
+      <p:ext uri="{BB962C8B-B14F-4D97-AF65-F5344CB8AC3E}">
+        <p14:creationId xmlns:p14="http://schemas.microsoft.com/office/powerpoint/2010/main" val="4165689634"/>
+      </p:ext>
+    </p:extLst>
+  </p:cSld>
+  <p:clrMapOvr>
+    <a:masterClrMapping/>
+  </p:clrMapOvr>
+  <mc:AlternateContent xmlns:mc="http://schemas.openxmlformats.org/markup-compatibility/2006">
+    <mc:Choice xmlns:p14="http://schemas.microsoft.com/office/powerpoint/2010/main" Requires="p14">
+      <p:transition spd="slow" p14:dur="1200">
+        <p14:prism/>
+      </p:transition>
+    </mc:Choice>
+    <mc:Fallback>
+      <p:transition spd="slow">
+        <p:fade/>
+      </p:transition>
+    </mc:Fallback>
+  </mc:AlternateContent>
+</p:sld>
+</file>
+
+<file path=ppt/slides/slide17.xml><?xml version="1.0" encoding="utf-8"?>
+<p:sld xmlns:a="http://schemas.openxmlformats.org/drawingml/2006/main" xmlns:r="http://schemas.openxmlformats.org/officeDocument/2006/relationships" xmlns:p="http://schemas.openxmlformats.org/presentationml/2006/main">
+  <p:cSld>
+    <p:spTree>
+      <p:nvGrpSpPr>
+        <p:cNvPr id="1" name=""/>
+        <p:cNvGrpSpPr/>
+        <p:nvPr/>
+      </p:nvGrpSpPr>
+      <p:grpSpPr>
+        <a:xfrm>
+          <a:off x="0" y="0"/>
+          <a:ext cx="0" cy="0"/>
+          <a:chOff x="0" y="0"/>
+          <a:chExt cx="0" cy="0"/>
+        </a:xfrm>
+      </p:grpSpPr>
+      <p:sp>
+        <p:nvSpPr>
+          <p:cNvPr id="2" name="Title 1">
+            <a:extLst>
+              <a:ext uri="{FF2B5EF4-FFF2-40B4-BE49-F238E27FC236}">
+                <a16:creationId xmlns:a16="http://schemas.microsoft.com/office/drawing/2014/main" id="{5B10EFEF-A5CA-4D88-A0D0-5B595051C9D5}"/>
+              </a:ext>
+            </a:extLst>
+          </p:cNvPr>
+          <p:cNvSpPr>
+            <a:spLocks noGrp="1"/>
+          </p:cNvSpPr>
+          <p:nvPr>
+            <p:ph type="title"/>
+          </p:nvPr>
+        </p:nvSpPr>
+        <p:spPr>
+          <a:xfrm>
+            <a:off x="3604846" y="87365"/>
+            <a:ext cx="4406411" cy="1293028"/>
+          </a:xfrm>
+        </p:spPr>
+        <p:txBody>
+          <a:bodyPr>
+            <a:normAutofit fontScale="90000"/>
+          </a:bodyPr>
+          <a:lstStyle/>
+          <a:p>
+            <a:r>
+              <a:rPr lang="en-US" sz="5400" dirty="0"/>
+              <a:t>8.References</a:t>
+            </a:r>
+            <a:endParaRPr lang="en-US" dirty="0"/>
+          </a:p>
+        </p:txBody>
+      </p:sp>
+      <p:sp>
+        <p:nvSpPr>
+          <p:cNvPr id="3" name="Content Placeholder 2">
+            <a:extLst>
+              <a:ext uri="{FF2B5EF4-FFF2-40B4-BE49-F238E27FC236}">
+                <a16:creationId xmlns:a16="http://schemas.microsoft.com/office/drawing/2014/main" id="{8252D5BF-F24F-48AB-8D80-B5FBE0C6F977}"/>
+              </a:ext>
+            </a:extLst>
+          </p:cNvPr>
+          <p:cNvSpPr>
+            <a:spLocks noGrp="1"/>
+          </p:cNvSpPr>
+          <p:nvPr>
+            <p:ph idx="1"/>
+          </p:nvPr>
+        </p:nvSpPr>
+        <p:spPr>
+          <a:xfrm>
+            <a:off x="685799" y="1406771"/>
+            <a:ext cx="10820400" cy="5143499"/>
+          </a:xfrm>
+        </p:spPr>
+        <p:txBody>
+          <a:bodyPr>
+            <a:normAutofit/>
+          </a:bodyPr>
+          <a:lstStyle/>
+          <a:p>
+            <a:pPr marL="0" indent="0">
+              <a:buNone/>
+            </a:pPr>
+            <a:r>
+              <a:rPr lang="en-US" sz="3200" b="1" dirty="0"/>
+              <a:t>GitHub:</a:t>
+            </a:r>
+          </a:p>
+          <a:p>
+            <a:pPr marL="0" indent="0">
+              <a:buNone/>
+            </a:pPr>
+            <a:r>
+              <a:rPr lang="en-US" sz="3200" b="1" dirty="0">
+                <a:hlinkClick r:id="rId2"/>
+              </a:rPr>
+              <a:t>https://github.com/</a:t>
+            </a:r>
+            <a:endParaRPr lang="en-US" sz="3200" b="1" dirty="0"/>
+          </a:p>
+          <a:p>
+            <a:pPr marL="0" indent="0">
+              <a:buNone/>
+            </a:pPr>
+            <a:r>
+              <a:rPr lang="en-US" sz="3200" b="1" dirty="0" err="1"/>
+              <a:t>Dzone</a:t>
+            </a:r>
+            <a:r>
+              <a:rPr lang="en-US" sz="3200" b="1" dirty="0"/>
+              <a:t>:</a:t>
+            </a:r>
+            <a:endParaRPr lang="en-US" sz="3200" dirty="0"/>
+          </a:p>
+          <a:p>
+            <a:pPr marL="0" indent="0">
+              <a:buNone/>
+            </a:pPr>
+            <a:r>
+              <a:rPr lang="en-US" sz="3200" b="1" dirty="0">
+                <a:hlinkClick r:id="rId3"/>
+              </a:rPr>
+              <a:t>https://dzone.com/</a:t>
+            </a:r>
+            <a:r>
+              <a:rPr lang="en-US" sz="3200" b="1" dirty="0"/>
+              <a:t> </a:t>
+            </a:r>
+          </a:p>
+          <a:p>
+            <a:pPr marL="0" indent="0">
+              <a:buNone/>
+            </a:pPr>
+            <a:r>
+              <a:rPr lang="en-US" sz="3200" b="1" dirty="0" err="1"/>
+              <a:t>Stackoverflow</a:t>
+            </a:r>
+            <a:r>
+              <a:rPr lang="en-US" sz="3200" b="1" dirty="0"/>
+              <a:t>:</a:t>
+            </a:r>
+          </a:p>
+          <a:p>
+            <a:pPr marL="0" indent="0">
+              <a:buNone/>
+            </a:pPr>
+            <a:r>
+              <a:rPr lang="en-US" sz="3200" b="1" dirty="0">
+                <a:hlinkClick r:id="rId4"/>
+              </a:rPr>
+              <a:t>https://stackoverflow.com/</a:t>
+            </a:r>
+            <a:endParaRPr lang="en-US" sz="3200" b="1" dirty="0"/>
+          </a:p>
+          <a:p>
+            <a:pPr marL="0" indent="0">
+              <a:buNone/>
+            </a:pPr>
+            <a:r>
+              <a:rPr lang="en-US" sz="3200" b="1" dirty="0" err="1"/>
+              <a:t>Cppreference</a:t>
+            </a:r>
+            <a:r>
+              <a:rPr lang="en-US" sz="3200" dirty="0"/>
+              <a:t>:</a:t>
+            </a:r>
+          </a:p>
+          <a:p>
+            <a:pPr marL="0" indent="0">
+              <a:buNone/>
+            </a:pPr>
+            <a:r>
+              <a:rPr lang="en-US" sz="3200" b="1" dirty="0">
+                <a:hlinkClick r:id="rId5"/>
+              </a:rPr>
+              <a:t>http://en.cppreference.com/w/</a:t>
+            </a:r>
+            <a:endParaRPr lang="en-US" sz="3200" b="1" dirty="0"/>
+          </a:p>
+          <a:p>
+            <a:pPr marL="0" indent="0">
+              <a:buNone/>
+            </a:pPr>
+            <a:endParaRPr lang="en-US" sz="3200" dirty="0"/>
+          </a:p>
+        </p:txBody>
+      </p:sp>
+    </p:spTree>
+    <p:extLst>
+      <p:ext uri="{BB962C8B-B14F-4D97-AF65-F5344CB8AC3E}">
+        <p14:creationId xmlns:p14="http://schemas.microsoft.com/office/powerpoint/2010/main" val="3329216113"/>
+      </p:ext>
+    </p:extLst>
+  </p:cSld>
+  <p:clrMapOvr>
+    <a:masterClrMapping/>
+  </p:clrMapOvr>
+  <mc:AlternateContent xmlns:mc="http://schemas.openxmlformats.org/markup-compatibility/2006">
+    <mc:Choice xmlns:p14="http://schemas.microsoft.com/office/powerpoint/2010/main" Requires="p14">
+      <p:transition spd="slow" p14:dur="1200">
+        <p14:prism/>
+      </p:transition>
+    </mc:Choice>
+    <mc:Fallback>
+      <p:transition spd="slow">
+        <p:fade/>
+      </p:transition>
+    </mc:Fallback>
+  </mc:AlternateContent>
+</p:sld>
+</file>
+
+<file path=ppt/slides/slide18.xml><?xml version="1.0" encoding="utf-8"?>
+<p:sld xmlns:a="http://schemas.openxmlformats.org/drawingml/2006/main" xmlns:r="http://schemas.openxmlformats.org/officeDocument/2006/relationships" xmlns:p="http://schemas.openxmlformats.org/presentationml/2006/main">
+  <p:cSld>
+    <p:spTree>
+      <p:nvGrpSpPr>
+        <p:cNvPr id="1" name=""/>
+        <p:cNvGrpSpPr/>
+        <p:nvPr/>
+      </p:nvGrpSpPr>
+      <p:grpSpPr>
+        <a:xfrm>
+          <a:off x="0" y="0"/>
+          <a:ext cx="0" cy="0"/>
+          <a:chOff x="0" y="0"/>
+          <a:chExt cx="0" cy="0"/>
+        </a:xfrm>
+      </p:grpSpPr>
+      <p:sp>
+        <p:nvSpPr>
+          <p:cNvPr id="2" name="Title 1">
+            <a:extLst>
+              <a:ext uri="{FF2B5EF4-FFF2-40B4-BE49-F238E27FC236}">
                 <a16:creationId xmlns:a16="http://schemas.microsoft.com/office/drawing/2014/main" id="{265CAAA4-A0B1-4581-A3E5-1B04F801D38F}"/>
               </a:ext>
             </a:extLst>
@@ -6902,7 +7246,7 @@
 </p:sld>
 </file>
 
-<file path=ppt/slides/slide17.xml><?xml version="1.0" encoding="utf-8"?>
+<file path=ppt/slides/slide19.xml><?xml version="1.0" encoding="utf-8"?>
 <p:sld xmlns:a="http://schemas.openxmlformats.org/drawingml/2006/main" xmlns:r="http://schemas.openxmlformats.org/officeDocument/2006/relationships" xmlns:p="http://schemas.openxmlformats.org/presentationml/2006/main">
   <p:cSld>
     <p:spTree>
@@ -6964,15 +7308,15 @@
   <p:clrMapOvr>
     <a:masterClrMapping/>
   </p:clrMapOvr>
-  <mc:AlternateContent xmlns:mc="http://schemas.openxmlformats.org/markup-compatibility/2006" xmlns:p14="http://schemas.microsoft.com/office/powerpoint/2010/main">
-    <mc:Choice Requires="p14">
-      <p:transition spd="slow" p14:dur="800">
-        <p:circle/>
+  <mc:AlternateContent xmlns:mc="http://schemas.openxmlformats.org/markup-compatibility/2006">
+    <mc:Choice xmlns:p14="http://schemas.microsoft.com/office/powerpoint/2010/main" Requires="p14">
+      <p:transition spd="slow" p14:dur="3900">
+        <p14:glitter pattern="hexagon"/>
       </p:transition>
     </mc:Choice>
-    <mc:Fallback xmlns="">
+    <mc:Fallback>
       <p:transition spd="slow">
-        <p:circle/>
+        <p:fade/>
       </p:transition>
     </mc:Fallback>
   </mc:AlternateContent>
@@ -7160,13 +7504,13 @@
   <p:clrMapOvr>
     <a:masterClrMapping/>
   </p:clrMapOvr>
-  <mc:AlternateContent xmlns:mc="http://schemas.openxmlformats.org/markup-compatibility/2006" xmlns:p159="http://schemas.microsoft.com/office/powerpoint/2015/09/main">
-    <mc:Choice Requires="p159">
-      <p:transition xmlns:p14="http://schemas.microsoft.com/office/powerpoint/2010/main" spd="slow" p14:dur="2000">
-        <p159:morph option="byObject"/>
+  <mc:AlternateContent xmlns:mc="http://schemas.openxmlformats.org/markup-compatibility/2006">
+    <mc:Choice xmlns:p14="http://schemas.microsoft.com/office/powerpoint/2010/main" Requires="p14">
+      <p:transition spd="slow" p14:dur="1200">
+        <p14:prism/>
       </p:transition>
     </mc:Choice>
-    <mc:Fallback xmlns="">
+    <mc:Fallback>
       <p:transition spd="slow">
         <p:fade/>
       </p:transition>
@@ -7309,13 +7653,13 @@
   <p:clrMapOvr>
     <a:masterClrMapping/>
   </p:clrMapOvr>
-  <mc:AlternateContent xmlns:mc="http://schemas.openxmlformats.org/markup-compatibility/2006" xmlns:p159="http://schemas.microsoft.com/office/powerpoint/2015/09/main">
-    <mc:Choice Requires="p159">
-      <p:transition xmlns:p14="http://schemas.microsoft.com/office/powerpoint/2010/main" spd="slow" p14:dur="2000">
-        <p159:morph option="byObject"/>
+  <mc:AlternateContent xmlns:mc="http://schemas.openxmlformats.org/markup-compatibility/2006">
+    <mc:Choice xmlns:p14="http://schemas.microsoft.com/office/powerpoint/2010/main" Requires="p14">
+      <p:transition spd="slow" p14:dur="1200">
+        <p14:prism/>
       </p:transition>
     </mc:Choice>
-    <mc:Fallback xmlns="">
+    <mc:Fallback>
       <p:transition spd="slow">
         <p:fade/>
       </p:transition>
@@ -7476,13 +7820,13 @@
   <p:clrMapOvr>
     <a:masterClrMapping/>
   </p:clrMapOvr>
-  <mc:AlternateContent xmlns:mc="http://schemas.openxmlformats.org/markup-compatibility/2006" xmlns:p159="http://schemas.microsoft.com/office/powerpoint/2015/09/main">
-    <mc:Choice Requires="p159">
-      <p:transition xmlns:p14="http://schemas.microsoft.com/office/powerpoint/2010/main" spd="slow" p14:dur="2000">
-        <p159:morph option="byObject"/>
+  <mc:AlternateContent xmlns:mc="http://schemas.openxmlformats.org/markup-compatibility/2006">
+    <mc:Choice xmlns:p14="http://schemas.microsoft.com/office/powerpoint/2010/main" Requires="p14">
+      <p:transition spd="slow" p14:dur="1200">
+        <p14:prism/>
       </p:transition>
     </mc:Choice>
-    <mc:Fallback xmlns="">
+    <mc:Fallback>
       <p:transition spd="slow">
         <p:fade/>
       </p:transition>
@@ -7660,13 +8004,13 @@
   <p:clrMapOvr>
     <a:masterClrMapping/>
   </p:clrMapOvr>
-  <mc:AlternateContent xmlns:mc="http://schemas.openxmlformats.org/markup-compatibility/2006" xmlns:p159="http://schemas.microsoft.com/office/powerpoint/2015/09/main">
-    <mc:Choice Requires="p159">
-      <p:transition xmlns:p14="http://schemas.microsoft.com/office/powerpoint/2010/main" spd="slow" p14:dur="2000">
-        <p159:morph option="byObject"/>
+  <mc:AlternateContent xmlns:mc="http://schemas.openxmlformats.org/markup-compatibility/2006">
+    <mc:Choice xmlns:p14="http://schemas.microsoft.com/office/powerpoint/2010/main" Requires="p14">
+      <p:transition spd="slow" p14:dur="1200">
+        <p14:prism/>
       </p:transition>
     </mc:Choice>
-    <mc:Fallback xmlns="">
+    <mc:Fallback>
       <p:transition spd="slow">
         <p:fade/>
       </p:transition>
@@ -7779,17 +8123,7 @@
             </a:r>
             <a:r>
               <a:rPr lang="en-US" sz="3200" dirty="0"/>
-              <a:t> Intel® Core™ i5-4210 </a:t>
-            </a:r>
-            <a:r>
-              <a:rPr lang="en-US" sz="3200" dirty="0">
-                <a:hlinkClick r:id="rId2"/>
-              </a:rPr>
-              <a:t>CPU@1.70GHz</a:t>
-            </a:r>
-            <a:r>
-              <a:rPr lang="en-US" sz="3200" dirty="0"/>
-              <a:t> 2.40Ghz</a:t>
+              <a:t> Intel® Core™ i5-4210 CPU@1.70GHz 2.40Ghz</a:t>
             </a:r>
           </a:p>
           <a:p>
@@ -7841,11 +8175,11 @@
             </a:r>
             <a:r>
               <a:rPr lang="en-US" sz="3200" dirty="0" err="1"/>
-              <a:t>CodeBlocks</a:t>
+              <a:t>CodeBlocks,Atom</a:t>
             </a:r>
             <a:r>
               <a:rPr lang="en-US" sz="3200" dirty="0"/>
-              <a:t>, Git &amp; Atom text editor</a:t>
+              <a:t> text editor</a:t>
             </a:r>
             <a:endParaRPr lang="en-US" sz="3200" b="1" dirty="0"/>
           </a:p>
@@ -7867,13 +8201,13 @@
   <p:clrMapOvr>
     <a:masterClrMapping/>
   </p:clrMapOvr>
-  <mc:AlternateContent xmlns:mc="http://schemas.openxmlformats.org/markup-compatibility/2006" xmlns:p159="http://schemas.microsoft.com/office/powerpoint/2015/09/main">
-    <mc:Choice Requires="p159">
-      <p:transition xmlns:p14="http://schemas.microsoft.com/office/powerpoint/2010/main" spd="slow" p14:dur="2000">
-        <p159:morph option="byObject"/>
+  <mc:AlternateContent xmlns:mc="http://schemas.openxmlformats.org/markup-compatibility/2006">
+    <mc:Choice xmlns:p14="http://schemas.microsoft.com/office/powerpoint/2010/main" Requires="p14">
+      <p:transition spd="slow" p14:dur="1200">
+        <p14:prism/>
       </p:transition>
     </mc:Choice>
-    <mc:Fallback xmlns="">
+    <mc:Fallback>
       <p:transition spd="slow">
         <p:fade/>
       </p:transition>
@@ -7934,69 +8268,21 @@
           </a:p>
         </p:txBody>
       </p:sp>
-      <p:sp>
-        <p:nvSpPr>
-          <p:cNvPr id="8" name="Content Placeholder 7">
+      <p:pic>
+        <p:nvPicPr>
+          <p:cNvPr id="4" name="Content Placeholder 3">
             <a:extLst>
               <a:ext uri="{FF2B5EF4-FFF2-40B4-BE49-F238E27FC236}">
-                <a16:creationId xmlns:a16="http://schemas.microsoft.com/office/drawing/2014/main" id="{F5B60ACF-92D6-4ADF-AB0D-77634F9921F4}"/>
-              </a:ext>
-            </a:extLst>
-          </p:cNvPr>
-          <p:cNvSpPr>
-            <a:spLocks noGrp="1"/>
-          </p:cNvSpPr>
-          <p:nvPr>
-            <p:ph sz="half" idx="1"/>
-          </p:nvPr>
-        </p:nvSpPr>
-        <p:spPr/>
-        <p:txBody>
-          <a:bodyPr/>
-          <a:lstStyle/>
-          <a:p>
-            <a:endParaRPr lang="en-US"/>
-          </a:p>
-        </p:txBody>
-      </p:sp>
-      <p:sp>
-        <p:nvSpPr>
-          <p:cNvPr id="9" name="Content Placeholder 8">
-            <a:extLst>
-              <a:ext uri="{FF2B5EF4-FFF2-40B4-BE49-F238E27FC236}">
-                <a16:creationId xmlns:a16="http://schemas.microsoft.com/office/drawing/2014/main" id="{1630920F-F971-4BEF-A0F3-5C018A16724E}"/>
-              </a:ext>
-            </a:extLst>
-          </p:cNvPr>
-          <p:cNvSpPr>
-            <a:spLocks noGrp="1"/>
-          </p:cNvSpPr>
-          <p:nvPr>
-            <p:ph sz="half" idx="2"/>
-          </p:nvPr>
-        </p:nvSpPr>
-        <p:spPr/>
-        <p:txBody>
-          <a:bodyPr/>
-          <a:lstStyle/>
-          <a:p>
-            <a:endParaRPr lang="en-US"/>
-          </a:p>
-        </p:txBody>
-      </p:sp>
-      <p:pic>
-        <p:nvPicPr>
-          <p:cNvPr id="5" name="Picture 4">
-            <a:extLst>
-              <a:ext uri="{FF2B5EF4-FFF2-40B4-BE49-F238E27FC236}">
-                <a16:creationId xmlns:a16="http://schemas.microsoft.com/office/drawing/2014/main" id="{FEC6C860-D135-40B3-A9AF-C18E6DE9738F}"/>
+                <a16:creationId xmlns:a16="http://schemas.microsoft.com/office/drawing/2014/main" id="{7455E4F7-E616-46DF-86CF-440A2D45AFF8}"/>
               </a:ext>
             </a:extLst>
           </p:cNvPr>
           <p:cNvPicPr>
-            <a:picLocks noChangeAspect="1"/>
+            <a:picLocks noGrp="1" noChangeAspect="1"/>
           </p:cNvPicPr>
-          <p:nvPr/>
+          <p:nvPr>
+            <p:ph sz="half" idx="1"/>
+          </p:nvPr>
         </p:nvPicPr>
         <p:blipFill>
           <a:blip r:embed="rId2"/>
@@ -8006,27 +8292,26 @@
         </p:blipFill>
         <p:spPr>
           <a:xfrm>
-            <a:off x="685800" y="2194559"/>
-            <a:ext cx="5334000" cy="4024125"/>
-          </a:xfrm>
-          <a:prstGeom prst="rect">
-            <a:avLst/>
-          </a:prstGeom>
+            <a:off x="184638" y="2165594"/>
+            <a:ext cx="5334000" cy="3921534"/>
+          </a:xfrm>
         </p:spPr>
       </p:pic>
       <p:pic>
         <p:nvPicPr>
-          <p:cNvPr id="7" name="Picture 6">
+          <p:cNvPr id="12" name="Content Placeholder 11">
             <a:extLst>
               <a:ext uri="{FF2B5EF4-FFF2-40B4-BE49-F238E27FC236}">
-                <a16:creationId xmlns:a16="http://schemas.microsoft.com/office/drawing/2014/main" id="{D8D0E609-B7FA-432E-80E2-2D9E8612180D}"/>
+                <a16:creationId xmlns:a16="http://schemas.microsoft.com/office/drawing/2014/main" id="{ACAED666-F771-4B78-9F9A-16693C1F3F60}"/>
               </a:ext>
             </a:extLst>
           </p:cNvPr>
           <p:cNvPicPr>
-            <a:picLocks noChangeAspect="1"/>
+            <a:picLocks noGrp="1" noChangeAspect="1"/>
           </p:cNvPicPr>
-          <p:nvPr/>
+          <p:nvPr>
+            <p:ph sz="half" idx="2"/>
+          </p:nvPr>
         </p:nvPicPr>
         <p:blipFill>
           <a:blip r:embed="rId3"/>
@@ -8036,12 +8321,9 @@
         </p:blipFill>
         <p:spPr>
           <a:xfrm>
-            <a:off x="6172200" y="2194558"/>
-            <a:ext cx="5334000" cy="4024125"/>
-          </a:xfrm>
-          <a:prstGeom prst="rect">
-            <a:avLst/>
-          </a:prstGeom>
+            <a:off x="5635869" y="2165594"/>
+            <a:ext cx="6556131" cy="3921534"/>
+          </a:xfrm>
         </p:spPr>
       </p:pic>
       <p:sp>
@@ -8058,7 +8340,7 @@
         </p:nvSpPr>
         <p:spPr>
           <a:xfrm>
-            <a:off x="685800" y="1457708"/>
+            <a:off x="184638" y="1457708"/>
             <a:ext cx="5334000" cy="707886"/>
           </a:xfrm>
           <a:prstGeom prst="rect">
@@ -8096,7 +8378,7 @@
         </p:nvSpPr>
         <p:spPr>
           <a:xfrm>
-            <a:off x="6172201" y="1457708"/>
+            <a:off x="5635869" y="1457708"/>
             <a:ext cx="5272454" cy="707886"/>
           </a:xfrm>
           <a:prstGeom prst="rect">
@@ -8129,13 +8411,13 @@
   <p:clrMapOvr>
     <a:masterClrMapping/>
   </p:clrMapOvr>
-  <mc:AlternateContent xmlns:mc="http://schemas.openxmlformats.org/markup-compatibility/2006" xmlns:p159="http://schemas.microsoft.com/office/powerpoint/2015/09/main">
-    <mc:Choice Requires="p159">
-      <p:transition xmlns:p14="http://schemas.microsoft.com/office/powerpoint/2010/main" spd="slow" p14:dur="2000">
-        <p159:morph option="byObject"/>
+  <mc:AlternateContent xmlns:mc="http://schemas.openxmlformats.org/markup-compatibility/2006">
+    <mc:Choice xmlns:p14="http://schemas.microsoft.com/office/powerpoint/2010/main" Requires="p14">
+      <p:transition spd="slow" p14:dur="1200">
+        <p14:prism/>
       </p:transition>
     </mc:Choice>
-    <mc:Fallback xmlns="">
+    <mc:Fallback>
       <p:transition spd="slow">
         <p:fade/>
       </p:transition>
@@ -8161,94 +8443,6 @@
           <a:chExt cx="0" cy="0"/>
         </a:xfrm>
       </p:grpSpPr>
-      <p:pic>
-        <p:nvPicPr>
-          <p:cNvPr id="9" name="Content Placeholder 8">
-            <a:extLst>
-              <a:ext uri="{FF2B5EF4-FFF2-40B4-BE49-F238E27FC236}">
-                <a16:creationId xmlns:a16="http://schemas.microsoft.com/office/drawing/2014/main" id="{184A3B7A-FCC8-4832-B1D9-8A23E5FC93C9}"/>
-              </a:ext>
-            </a:extLst>
-          </p:cNvPr>
-          <p:cNvPicPr>
-            <a:picLocks noGrp="1" noChangeAspect="1"/>
-          </p:cNvPicPr>
-          <p:nvPr>
-            <p:ph sz="half" idx="1"/>
-          </p:nvPr>
-        </p:nvPicPr>
-        <p:blipFill>
-          <a:blip r:embed="rId2"/>
-          <a:stretch>
-            <a:fillRect/>
-          </a:stretch>
-        </p:blipFill>
-        <p:spPr>
-          <a:xfrm>
-            <a:off x="878639" y="1921078"/>
-            <a:ext cx="3193022" cy="4084068"/>
-          </a:xfrm>
-        </p:spPr>
-      </p:pic>
-      <p:pic>
-        <p:nvPicPr>
-          <p:cNvPr id="11" name="Content Placeholder 10">
-            <a:extLst>
-              <a:ext uri="{FF2B5EF4-FFF2-40B4-BE49-F238E27FC236}">
-                <a16:creationId xmlns:a16="http://schemas.microsoft.com/office/drawing/2014/main" id="{5727663C-2FB5-473A-B487-A30C1776BA0F}"/>
-              </a:ext>
-            </a:extLst>
-          </p:cNvPr>
-          <p:cNvPicPr>
-            <a:picLocks noGrp="1" noChangeAspect="1"/>
-          </p:cNvPicPr>
-          <p:nvPr>
-            <p:ph sz="half" idx="2"/>
-          </p:nvPr>
-        </p:nvPicPr>
-        <p:blipFill>
-          <a:blip r:embed="rId3"/>
-          <a:stretch>
-            <a:fillRect/>
-          </a:stretch>
-        </p:blipFill>
-        <p:spPr>
-          <a:xfrm>
-            <a:off x="5323610" y="1921078"/>
-            <a:ext cx="2189285" cy="4242330"/>
-          </a:xfrm>
-        </p:spPr>
-      </p:pic>
-      <p:pic>
-        <p:nvPicPr>
-          <p:cNvPr id="13" name="Picture 12">
-            <a:extLst>
-              <a:ext uri="{FF2B5EF4-FFF2-40B4-BE49-F238E27FC236}">
-                <a16:creationId xmlns:a16="http://schemas.microsoft.com/office/drawing/2014/main" id="{576C1658-38EB-4F33-9AA0-E57E8F172D36}"/>
-              </a:ext>
-            </a:extLst>
-          </p:cNvPr>
-          <p:cNvPicPr>
-            <a:picLocks noChangeAspect="1"/>
-          </p:cNvPicPr>
-          <p:nvPr/>
-        </p:nvPicPr>
-        <p:blipFill>
-          <a:blip r:embed="rId4"/>
-          <a:stretch>
-            <a:fillRect/>
-          </a:stretch>
-        </p:blipFill>
-        <p:spPr>
-          <a:xfrm>
-            <a:off x="8764844" y="1921078"/>
-            <a:ext cx="2480517" cy="4084068"/>
-          </a:xfrm>
-          <a:prstGeom prst="rect">
-            <a:avLst/>
-          </a:prstGeom>
-        </p:spPr>
-      </p:pic>
       <p:sp>
         <p:nvSpPr>
           <p:cNvPr id="14" name="TextBox 13">
@@ -8301,7 +8495,7 @@
           <p:nvPr/>
         </p:nvPicPr>
         <p:blipFill>
-          <a:blip r:embed="rId5"/>
+          <a:blip r:embed="rId2"/>
           <a:stretch>
             <a:fillRect/>
           </a:stretch>
@@ -8314,6 +8508,64 @@
           <a:prstGeom prst="rect">
             <a:avLst/>
           </a:prstGeom>
+        </p:spPr>
+      </p:pic>
+      <p:pic>
+        <p:nvPicPr>
+          <p:cNvPr id="7" name="Content Placeholder 6">
+            <a:extLst>
+              <a:ext uri="{FF2B5EF4-FFF2-40B4-BE49-F238E27FC236}">
+                <a16:creationId xmlns:a16="http://schemas.microsoft.com/office/drawing/2014/main" id="{0E5DB6D5-AAA6-48C0-AE19-9529D813A0F5}"/>
+              </a:ext>
+            </a:extLst>
+          </p:cNvPr>
+          <p:cNvPicPr>
+            <a:picLocks noGrp="1" noChangeAspect="1"/>
+          </p:cNvPicPr>
+          <p:nvPr>
+            <p:ph sz="half" idx="1"/>
+          </p:nvPr>
+        </p:nvPicPr>
+        <p:blipFill>
+          <a:blip r:embed="rId3"/>
+          <a:stretch>
+            <a:fillRect/>
+          </a:stretch>
+        </p:blipFill>
+        <p:spPr>
+          <a:xfrm>
+            <a:off x="531925" y="2359982"/>
+            <a:ext cx="4730739" cy="2737312"/>
+          </a:xfrm>
+        </p:spPr>
+      </p:pic>
+      <p:pic>
+        <p:nvPicPr>
+          <p:cNvPr id="22" name="Content Placeholder 21">
+            <a:extLst>
+              <a:ext uri="{FF2B5EF4-FFF2-40B4-BE49-F238E27FC236}">
+                <a16:creationId xmlns:a16="http://schemas.microsoft.com/office/drawing/2014/main" id="{78147706-62B2-4B28-BEBC-2EAD90F6C216}"/>
+              </a:ext>
+            </a:extLst>
+          </p:cNvPr>
+          <p:cNvPicPr>
+            <a:picLocks noGrp="1" noChangeAspect="1"/>
+          </p:cNvPicPr>
+          <p:nvPr>
+            <p:ph sz="half" idx="2"/>
+          </p:nvPr>
+        </p:nvPicPr>
+        <p:blipFill>
+          <a:blip r:embed="rId4"/>
+          <a:stretch>
+            <a:fillRect/>
+          </a:stretch>
+        </p:blipFill>
+        <p:spPr>
+          <a:xfrm>
+            <a:off x="6643991" y="2359982"/>
+            <a:ext cx="5285327" cy="2737312"/>
+          </a:xfrm>
         </p:spPr>
       </p:pic>
     </p:spTree>
@@ -8326,13 +8578,13 @@
   <p:clrMapOvr>
     <a:masterClrMapping/>
   </p:clrMapOvr>
-  <mc:AlternateContent xmlns:mc="http://schemas.openxmlformats.org/markup-compatibility/2006" xmlns:p159="http://schemas.microsoft.com/office/powerpoint/2015/09/main">
-    <mc:Choice Requires="p159">
-      <p:transition xmlns:p14="http://schemas.microsoft.com/office/powerpoint/2010/main" spd="slow" p14:dur="2000">
-        <p159:morph option="byObject"/>
+  <mc:AlternateContent xmlns:mc="http://schemas.openxmlformats.org/markup-compatibility/2006">
+    <mc:Choice xmlns:p14="http://schemas.microsoft.com/office/powerpoint/2010/main" Requires="p14">
+      <p:transition spd="slow" p14:dur="900">
+        <p14:warp dir="in"/>
       </p:transition>
     </mc:Choice>
-    <mc:Fallback xmlns="">
+    <mc:Fallback>
       <p:transition spd="slow">
         <p:fade/>
       </p:transition>
@@ -8360,105 +8612,10 @@
       </p:grpSpPr>
       <p:pic>
         <p:nvPicPr>
-          <p:cNvPr id="6" name="Content Placeholder 5">
+          <p:cNvPr id="6" name="Picture 5">
             <a:extLst>
               <a:ext uri="{FF2B5EF4-FFF2-40B4-BE49-F238E27FC236}">
-                <a16:creationId xmlns:a16="http://schemas.microsoft.com/office/drawing/2014/main" id="{6580D600-2C09-4332-A78F-D6052E7A1456}"/>
-              </a:ext>
-            </a:extLst>
-          </p:cNvPr>
-          <p:cNvPicPr>
-            <a:picLocks noGrp="1" noChangeAspect="1"/>
-          </p:cNvPicPr>
-          <p:nvPr>
-            <p:ph sz="half" idx="1"/>
-          </p:nvPr>
-        </p:nvPicPr>
-        <p:blipFill>
-          <a:blip r:embed="rId2"/>
-          <a:stretch>
-            <a:fillRect/>
-          </a:stretch>
-        </p:blipFill>
-        <p:spPr>
-          <a:xfrm>
-            <a:off x="554476" y="1776192"/>
-            <a:ext cx="6504435" cy="4844415"/>
-          </a:xfrm>
-        </p:spPr>
-      </p:pic>
-      <p:pic>
-        <p:nvPicPr>
-          <p:cNvPr id="8" name="Content Placeholder 7">
-            <a:extLst>
-              <a:ext uri="{FF2B5EF4-FFF2-40B4-BE49-F238E27FC236}">
-                <a16:creationId xmlns:a16="http://schemas.microsoft.com/office/drawing/2014/main" id="{870F04EB-EA44-434A-ADD9-F6446BAEBE54}"/>
-              </a:ext>
-            </a:extLst>
-          </p:cNvPr>
-          <p:cNvPicPr>
-            <a:picLocks noGrp="1" noChangeAspect="1"/>
-          </p:cNvPicPr>
-          <p:nvPr>
-            <p:ph sz="half" idx="2"/>
-          </p:nvPr>
-        </p:nvPicPr>
-        <p:blipFill>
-          <a:blip r:embed="rId3"/>
-          <a:stretch>
-            <a:fillRect/>
-          </a:stretch>
-        </p:blipFill>
-        <p:spPr>
-          <a:xfrm>
-            <a:off x="8334550" y="1776193"/>
-            <a:ext cx="2744005" cy="3077160"/>
-          </a:xfrm>
-        </p:spPr>
-      </p:pic>
-      <p:sp>
-        <p:nvSpPr>
-          <p:cNvPr id="11" name="TextBox 10">
-            <a:extLst>
-              <a:ext uri="{FF2B5EF4-FFF2-40B4-BE49-F238E27FC236}">
-                <a16:creationId xmlns:a16="http://schemas.microsoft.com/office/drawing/2014/main" id="{573F684E-E372-4257-9845-4B8186C37FD4}"/>
-              </a:ext>
-            </a:extLst>
-          </p:cNvPr>
-          <p:cNvSpPr txBox="1"/>
-          <p:nvPr/>
-        </p:nvSpPr>
-        <p:spPr>
-          <a:xfrm>
-            <a:off x="4666158" y="359736"/>
-            <a:ext cx="4231657" cy="769441"/>
-          </a:xfrm>
-          <a:prstGeom prst="rect">
-            <a:avLst/>
-          </a:prstGeom>
-          <a:noFill/>
-        </p:spPr>
-        <p:txBody>
-          <a:bodyPr wrap="square" rtlCol="0">
-            <a:spAutoFit/>
-          </a:bodyPr>
-          <a:lstStyle/>
-          <a:p>
-            <a:r>
-              <a:rPr lang="en-US" sz="4400" dirty="0">
-                <a:latin typeface="Baskerville Old Face" panose="02020602080505020303" pitchFamily="18" charset="0"/>
-              </a:rPr>
-              <a:t>B. Drop  (       )</a:t>
-            </a:r>
-          </a:p>
-        </p:txBody>
-      </p:sp>
-      <p:pic>
-        <p:nvPicPr>
-          <p:cNvPr id="13" name="Picture 12">
-            <a:extLst>
-              <a:ext uri="{FF2B5EF4-FFF2-40B4-BE49-F238E27FC236}">
-                <a16:creationId xmlns:a16="http://schemas.microsoft.com/office/drawing/2014/main" id="{531A878C-6F88-4794-B085-FAE175EC20B3}"/>
+                <a16:creationId xmlns:a16="http://schemas.microsoft.com/office/drawing/2014/main" id="{E9517074-A6E2-45B6-8CC8-92B3A5405079}"/>
               </a:ext>
             </a:extLst>
           </p:cNvPr>
@@ -8468,15 +8625,15 @@
           <p:nvPr/>
         </p:nvPicPr>
         <p:blipFill>
-          <a:blip r:embed="rId4"/>
+          <a:blip r:embed="rId2"/>
           <a:stretch>
             <a:fillRect/>
           </a:stretch>
         </p:blipFill>
         <p:spPr>
           <a:xfrm>
-            <a:off x="7058912" y="347319"/>
-            <a:ext cx="945563" cy="794273"/>
+            <a:off x="855184" y="1339777"/>
+            <a:ext cx="3971794" cy="5059811"/>
           </a:xfrm>
           <a:prstGeom prst="rect">
             <a:avLst/>
@@ -8485,10 +8642,10 @@
       </p:pic>
       <p:pic>
         <p:nvPicPr>
-          <p:cNvPr id="15" name="Picture 14">
+          <p:cNvPr id="8" name="Picture 7">
             <a:extLst>
               <a:ext uri="{FF2B5EF4-FFF2-40B4-BE49-F238E27FC236}">
-                <a16:creationId xmlns:a16="http://schemas.microsoft.com/office/drawing/2014/main" id="{C517F076-79EC-4312-A6F4-F43AD136D4DF}"/>
+                <a16:creationId xmlns:a16="http://schemas.microsoft.com/office/drawing/2014/main" id="{538F3F4E-8B15-4DDE-806F-0FE0B61AB647}"/>
               </a:ext>
             </a:extLst>
           </p:cNvPr>
@@ -8498,15 +8655,15 @@
           <p:nvPr/>
         </p:nvPicPr>
         <p:blipFill>
-          <a:blip r:embed="rId5"/>
+          <a:blip r:embed="rId3"/>
           <a:stretch>
             <a:fillRect/>
           </a:stretch>
         </p:blipFill>
         <p:spPr>
           <a:xfrm>
-            <a:off x="8316160" y="5181258"/>
-            <a:ext cx="2780786" cy="1439350"/>
+            <a:off x="5732586" y="1339777"/>
+            <a:ext cx="6031522" cy="5059811"/>
           </a:xfrm>
           <a:prstGeom prst="rect">
             <a:avLst/>
@@ -8516,20 +8673,20 @@
     </p:spTree>
     <p:extLst>
       <p:ext uri="{BB962C8B-B14F-4D97-AF65-F5344CB8AC3E}">
-        <p14:creationId xmlns:p14="http://schemas.microsoft.com/office/powerpoint/2010/main" val="1726096973"/>
+        <p14:creationId xmlns:p14="http://schemas.microsoft.com/office/powerpoint/2010/main" val="4021152068"/>
       </p:ext>
     </p:extLst>
   </p:cSld>
   <p:clrMapOvr>
     <a:masterClrMapping/>
   </p:clrMapOvr>
-  <mc:AlternateContent xmlns:mc="http://schemas.openxmlformats.org/markup-compatibility/2006" xmlns:p159="http://schemas.microsoft.com/office/powerpoint/2015/09/main">
-    <mc:Choice Requires="p159">
-      <p:transition xmlns:p14="http://schemas.microsoft.com/office/powerpoint/2010/main" spd="slow" p14:dur="2000">
-        <p159:morph option="byObject"/>
+  <mc:AlternateContent xmlns:mc="http://schemas.openxmlformats.org/markup-compatibility/2006">
+    <mc:Choice xmlns:p14="http://schemas.microsoft.com/office/powerpoint/2010/main" Requires="p14">
+      <p:transition spd="slow" p14:dur="2000">
+        <p14:prism isContent="1"/>
       </p:transition>
     </mc:Choice>
-    <mc:Fallback xmlns="">
+    <mc:Fallback>
       <p:transition spd="slow">
         <p:fade/>
       </p:transition>

</xml_diff>